<commit_message>
Finish slides for page 25 and 26 of textbook
</commit_message>
<xml_diff>
--- a/csci370_ch1_presentation.pptx
+++ b/csci370_ch1_presentation.pptx
@@ -7,14 +7,22 @@
   <p:sldIdLst>
     <p:sldId id="256" r:id="rId2"/>
     <p:sldId id="257" r:id="rId3"/>
-    <p:sldId id="264" r:id="rId4"/>
-    <p:sldId id="262" r:id="rId5"/>
-    <p:sldId id="259" r:id="rId6"/>
-    <p:sldId id="260" r:id="rId7"/>
-    <p:sldId id="261" r:id="rId8"/>
-    <p:sldId id="258" r:id="rId9"/>
-    <p:sldId id="263" r:id="rId10"/>
-    <p:sldId id="265" r:id="rId11"/>
+    <p:sldId id="269" r:id="rId4"/>
+    <p:sldId id="270" r:id="rId5"/>
+    <p:sldId id="264" r:id="rId6"/>
+    <p:sldId id="271" r:id="rId7"/>
+    <p:sldId id="266" r:id="rId8"/>
+    <p:sldId id="267" r:id="rId9"/>
+    <p:sldId id="268" r:id="rId10"/>
+    <p:sldId id="272" r:id="rId11"/>
+    <p:sldId id="273" r:id="rId12"/>
+    <p:sldId id="262" r:id="rId13"/>
+    <p:sldId id="259" r:id="rId14"/>
+    <p:sldId id="260" r:id="rId15"/>
+    <p:sldId id="261" r:id="rId16"/>
+    <p:sldId id="258" r:id="rId17"/>
+    <p:sldId id="263" r:id="rId18"/>
+    <p:sldId id="265" r:id="rId19"/>
   </p:sldIdLst>
   <p:sldSz cx="12192000" cy="6858000"/>
   <p:notesSz cx="6858000" cy="9144000"/>
@@ -690,7 +698,7 @@
           <a:p>
             <a:fld id="{D6D0F569-AC90-44EB-9EF4-4E5C2F5D823C}" type="datetime1">
               <a:rPr lang="en-US" smtClean="0"/>
-              <a:t>1/12/2021</a:t>
+              <a:t>1/13/2021</a:t>
             </a:fld>
             <a:endParaRPr lang="en-US" dirty="0"/>
           </a:p>
@@ -1369,7 +1377,7 @@
           <a:p>
             <a:fld id="{46BA7D41-E8B7-4A0B-B861-3EC4AE88917D}" type="datetime1">
               <a:rPr lang="en-US" smtClean="0"/>
-              <a:t>1/12/2021</a:t>
+              <a:t>1/13/2021</a:t>
             </a:fld>
             <a:endParaRPr lang="en-US" dirty="0"/>
           </a:p>
@@ -2058,7 +2066,7 @@
           <a:p>
             <a:fld id="{A7C34823-0B19-4B4E-A643-7A3B0A3D24D6}" type="datetime1">
               <a:rPr lang="en-US" smtClean="0"/>
-              <a:t>1/12/2021</a:t>
+              <a:t>1/13/2021</a:t>
             </a:fld>
             <a:endParaRPr lang="en-US" dirty="0"/>
           </a:p>
@@ -2740,7 +2748,7 @@
           <a:p>
             <a:fld id="{8C2D79EF-17C8-45D8-9866-DAF5723FC604}" type="datetime1">
               <a:rPr lang="en-US" smtClean="0"/>
-              <a:t>1/12/2021</a:t>
+              <a:t>1/13/2021</a:t>
             </a:fld>
             <a:endParaRPr lang="en-US" dirty="0"/>
           </a:p>
@@ -3495,7 +3503,7 @@
           <a:p>
             <a:fld id="{DFFC2ADC-3680-4013-A757-E4663495DB98}" type="datetime1">
               <a:rPr lang="en-US" smtClean="0"/>
-              <a:t>1/12/2021</a:t>
+              <a:t>1/13/2021</a:t>
             </a:fld>
             <a:endParaRPr lang="en-US" dirty="0"/>
           </a:p>
@@ -4242,7 +4250,7 @@
           <a:p>
             <a:fld id="{4751BA94-5DCA-4F19-960F-0FB2BD5EE85A}" type="datetime1">
               <a:rPr lang="en-US" smtClean="0"/>
-              <a:t>1/12/2021</a:t>
+              <a:t>1/13/2021</a:t>
             </a:fld>
             <a:endParaRPr lang="en-US" dirty="0"/>
           </a:p>
@@ -5136,7 +5144,7 @@
           <a:p>
             <a:fld id="{01BED947-38D9-44AC-8B89-E79758333B77}" type="datetime1">
               <a:rPr lang="en-US" smtClean="0"/>
-              <a:t>1/12/2021</a:t>
+              <a:t>1/13/2021</a:t>
             </a:fld>
             <a:endParaRPr lang="en-US" dirty="0"/>
           </a:p>
@@ -5757,7 +5765,7 @@
           <a:p>
             <a:fld id="{3781E23F-BD3C-4F23-B116-2B758120C8AC}" type="datetime1">
               <a:rPr lang="en-US" smtClean="0"/>
-              <a:t>1/12/2021</a:t>
+              <a:t>1/13/2021</a:t>
             </a:fld>
             <a:endParaRPr lang="en-US" dirty="0"/>
           </a:p>
@@ -6349,7 +6357,7 @@
           <a:p>
             <a:fld id="{473CFAA9-6D59-4D98-869E-ACBDB83B2CA4}" type="datetime1">
               <a:rPr lang="en-US" smtClean="0"/>
-              <a:t>1/12/2021</a:t>
+              <a:t>1/13/2021</a:t>
             </a:fld>
             <a:endParaRPr lang="en-US"/>
           </a:p>
@@ -7141,7 +7149,7 @@
           <a:p>
             <a:fld id="{DC410804-27E3-430A-BB42-B831260DE39A}" type="datetime1">
               <a:rPr lang="en-US" smtClean="0"/>
-              <a:t>1/12/2021</a:t>
+              <a:t>1/13/2021</a:t>
             </a:fld>
             <a:endParaRPr lang="en-US" dirty="0"/>
           </a:p>
@@ -7912,7 +7920,7 @@
           <a:p>
             <a:fld id="{60E22DE3-3D1A-4D53-B9A6-6C7463B8C992}" type="datetime1">
               <a:rPr lang="en-US" smtClean="0"/>
-              <a:t>1/12/2021</a:t>
+              <a:t>1/13/2021</a:t>
             </a:fld>
             <a:endParaRPr lang="en-US" dirty="0"/>
           </a:p>
@@ -8223,7 +8231,7 @@
             <a:fld id="{5ECD8B30-1B71-45A1-8314-D59C86F581E1}" type="datetime1">
               <a:rPr lang="en-US" smtClean="0"/>
               <a:pPr/>
-              <a:t>1/12/2021</a:t>
+              <a:t>1/13/2021</a:t>
             </a:fld>
             <a:endParaRPr lang="en-US" b="1" dirty="0"/>
           </a:p>
@@ -8749,6 +8757,1110 @@
           <p:cNvPr id="2" name="Title 1">
             <a:extLst>
               <a:ext uri="{FF2B5EF4-FFF2-40B4-BE49-F238E27FC236}">
+                <a16:creationId xmlns:a16="http://schemas.microsoft.com/office/drawing/2014/main" id="{AF39C42B-AF80-4CE7-A7BE-EA646A7DB757}"/>
+              </a:ext>
+            </a:extLst>
+          </p:cNvPr>
+          <p:cNvSpPr>
+            <a:spLocks noGrp="1"/>
+          </p:cNvSpPr>
+          <p:nvPr>
+            <p:ph type="title"/>
+          </p:nvPr>
+        </p:nvSpPr>
+        <p:spPr/>
+        <p:txBody>
+          <a:bodyPr/>
+          <a:lstStyle/>
+          <a:p>
+            <a:r>
+              <a:rPr lang="en-US" dirty="0"/>
+              <a:t>Integrated Circuits (ICs)</a:t>
+            </a:r>
+          </a:p>
+        </p:txBody>
+      </p:sp>
+      <p:sp>
+        <p:nvSpPr>
+          <p:cNvPr id="3" name="Content Placeholder 2">
+            <a:extLst>
+              <a:ext uri="{FF2B5EF4-FFF2-40B4-BE49-F238E27FC236}">
+                <a16:creationId xmlns:a16="http://schemas.microsoft.com/office/drawing/2014/main" id="{DEA25680-F8BD-4732-A92B-0ACDED11EE77}"/>
+              </a:ext>
+            </a:extLst>
+          </p:cNvPr>
+          <p:cNvSpPr>
+            <a:spLocks noGrp="1"/>
+          </p:cNvSpPr>
+          <p:nvPr>
+            <p:ph idx="1"/>
+          </p:nvPr>
+        </p:nvSpPr>
+        <p:spPr/>
+        <p:txBody>
+          <a:bodyPr/>
+          <a:lstStyle/>
+          <a:p>
+            <a:r>
+              <a:rPr lang="en-US" dirty="0"/>
+              <a:t>Evidence of Moore’s Law</a:t>
+            </a:r>
+          </a:p>
+          <a:p>
+            <a:pPr lvl="1"/>
+            <a:r>
+              <a:rPr lang="en-US" i="1" dirty="0"/>
+              <a:t>I hope this humor is appreciated in class</a:t>
+            </a:r>
+          </a:p>
+        </p:txBody>
+      </p:sp>
+      <p:pic>
+        <p:nvPicPr>
+          <p:cNvPr id="4098" name="Picture 2" descr="Mobile phone evolution : funny">
+            <a:extLst>
+              <a:ext uri="{FF2B5EF4-FFF2-40B4-BE49-F238E27FC236}">
+                <a16:creationId xmlns:a16="http://schemas.microsoft.com/office/drawing/2014/main" id="{D70BD093-B933-41D3-A289-AE7037660032}"/>
+              </a:ext>
+            </a:extLst>
+          </p:cNvPr>
+          <p:cNvPicPr>
+            <a:picLocks noChangeAspect="1" noChangeArrowheads="1"/>
+          </p:cNvPicPr>
+          <p:nvPr/>
+        </p:nvPicPr>
+        <p:blipFill>
+          <a:blip r:embed="rId2">
+            <a:extLst>
+              <a:ext uri="{28A0092B-C50C-407E-A947-70E740481C1C}">
+                <a14:useLocalDpi xmlns:a14="http://schemas.microsoft.com/office/drawing/2010/main" val="0"/>
+              </a:ext>
+            </a:extLst>
+          </a:blip>
+          <a:srcRect/>
+          <a:stretch>
+            <a:fillRect/>
+          </a:stretch>
+        </p:blipFill>
+        <p:spPr bwMode="auto">
+          <a:xfrm>
+            <a:off x="2762250" y="3006725"/>
+            <a:ext cx="6667500" cy="3486150"/>
+          </a:xfrm>
+          <a:prstGeom prst="rect">
+            <a:avLst/>
+          </a:prstGeom>
+          <a:noFill/>
+          <a:extLst>
+            <a:ext uri="{909E8E84-426E-40DD-AFC4-6F175D3DCCD1}">
+              <a14:hiddenFill xmlns:a14="http://schemas.microsoft.com/office/drawing/2010/main">
+                <a:solidFill>
+                  <a:srgbClr val="FFFFFF"/>
+                </a:solidFill>
+              </a14:hiddenFill>
+            </a:ext>
+          </a:extLst>
+        </p:spPr>
+      </p:pic>
+    </p:spTree>
+    <p:extLst>
+      <p:ext uri="{BB962C8B-B14F-4D97-AF65-F5344CB8AC3E}">
+        <p14:creationId xmlns:p14="http://schemas.microsoft.com/office/powerpoint/2010/main" val="2281064784"/>
+      </p:ext>
+    </p:extLst>
+  </p:cSld>
+  <p:clrMapOvr>
+    <a:masterClrMapping/>
+  </p:clrMapOvr>
+</p:sld>
+</file>
+
+<file path=ppt/slides/slide11.xml><?xml version="1.0" encoding="utf-8"?>
+<p:sld xmlns:a="http://schemas.openxmlformats.org/drawingml/2006/main" xmlns:r="http://schemas.openxmlformats.org/officeDocument/2006/relationships" xmlns:p="http://schemas.openxmlformats.org/presentationml/2006/main">
+  <p:cSld>
+    <p:spTree>
+      <p:nvGrpSpPr>
+        <p:cNvPr id="1" name=""/>
+        <p:cNvGrpSpPr/>
+        <p:nvPr/>
+      </p:nvGrpSpPr>
+      <p:grpSpPr>
+        <a:xfrm>
+          <a:off x="0" y="0"/>
+          <a:ext cx="0" cy="0"/>
+          <a:chOff x="0" y="0"/>
+          <a:chExt cx="0" cy="0"/>
+        </a:xfrm>
+      </p:grpSpPr>
+      <p:sp>
+        <p:nvSpPr>
+          <p:cNvPr id="2" name="Title 1">
+            <a:extLst>
+              <a:ext uri="{FF2B5EF4-FFF2-40B4-BE49-F238E27FC236}">
+                <a16:creationId xmlns:a16="http://schemas.microsoft.com/office/drawing/2014/main" id="{A90300D2-DB0D-4562-81B8-424D0507621C}"/>
+              </a:ext>
+            </a:extLst>
+          </p:cNvPr>
+          <p:cNvSpPr>
+            <a:spLocks noGrp="1"/>
+          </p:cNvSpPr>
+          <p:nvPr>
+            <p:ph type="title"/>
+          </p:nvPr>
+        </p:nvSpPr>
+        <p:spPr/>
+        <p:txBody>
+          <a:bodyPr/>
+          <a:lstStyle/>
+          <a:p>
+            <a:r>
+              <a:rPr lang="en-US" dirty="0"/>
+              <a:t>Food for thought: Future</a:t>
+            </a:r>
+          </a:p>
+        </p:txBody>
+      </p:sp>
+      <p:sp>
+        <p:nvSpPr>
+          <p:cNvPr id="3" name="Content Placeholder 2">
+            <a:extLst>
+              <a:ext uri="{FF2B5EF4-FFF2-40B4-BE49-F238E27FC236}">
+                <a16:creationId xmlns:a16="http://schemas.microsoft.com/office/drawing/2014/main" id="{496F4BF8-FE2B-43EE-A921-D5169C1A7438}"/>
+              </a:ext>
+            </a:extLst>
+          </p:cNvPr>
+          <p:cNvSpPr>
+            <a:spLocks noGrp="1"/>
+          </p:cNvSpPr>
+          <p:nvPr>
+            <p:ph idx="1"/>
+          </p:nvPr>
+        </p:nvSpPr>
+        <p:spPr/>
+        <p:txBody>
+          <a:bodyPr/>
+          <a:lstStyle/>
+          <a:p>
+            <a:r>
+              <a:rPr lang="en-US" dirty="0"/>
+              <a:t>Quantum computers</a:t>
+            </a:r>
+          </a:p>
+          <a:p>
+            <a:pPr lvl="1"/>
+            <a:r>
+              <a:rPr lang="en-US" dirty="0"/>
+              <a:t>Qubits</a:t>
+            </a:r>
+          </a:p>
+        </p:txBody>
+      </p:sp>
+    </p:spTree>
+    <p:extLst>
+      <p:ext uri="{BB962C8B-B14F-4D97-AF65-F5344CB8AC3E}">
+        <p14:creationId xmlns:p14="http://schemas.microsoft.com/office/powerpoint/2010/main" val="3995910141"/>
+      </p:ext>
+    </p:extLst>
+  </p:cSld>
+  <p:clrMapOvr>
+    <a:masterClrMapping/>
+  </p:clrMapOvr>
+</p:sld>
+</file>
+
+<file path=ppt/slides/slide12.xml><?xml version="1.0" encoding="utf-8"?>
+<p:sld xmlns:a="http://schemas.openxmlformats.org/drawingml/2006/main" xmlns:r="http://schemas.openxmlformats.org/officeDocument/2006/relationships" xmlns:p="http://schemas.openxmlformats.org/presentationml/2006/main">
+  <p:cSld>
+    <p:spTree>
+      <p:nvGrpSpPr>
+        <p:cNvPr id="1" name=""/>
+        <p:cNvGrpSpPr/>
+        <p:nvPr/>
+      </p:nvGrpSpPr>
+      <p:grpSpPr>
+        <a:xfrm>
+          <a:off x="0" y="0"/>
+          <a:ext cx="0" cy="0"/>
+          <a:chOff x="0" y="0"/>
+          <a:chExt cx="0" cy="0"/>
+        </a:xfrm>
+      </p:grpSpPr>
+      <p:sp>
+        <p:nvSpPr>
+          <p:cNvPr id="2" name="Title 1">
+            <a:extLst>
+              <a:ext uri="{FF2B5EF4-FFF2-40B4-BE49-F238E27FC236}">
+                <a16:creationId xmlns:a16="http://schemas.microsoft.com/office/drawing/2014/main" id="{E4EDD309-5007-47B1-AB3C-D68CF0E2D53E}"/>
+              </a:ext>
+            </a:extLst>
+          </p:cNvPr>
+          <p:cNvSpPr>
+            <a:spLocks noGrp="1"/>
+          </p:cNvSpPr>
+          <p:nvPr>
+            <p:ph type="title"/>
+          </p:nvPr>
+        </p:nvSpPr>
+        <p:spPr/>
+        <p:txBody>
+          <a:bodyPr/>
+          <a:lstStyle/>
+          <a:p>
+            <a:r>
+              <a:rPr lang="en-US" dirty="0"/>
+              <a:t>Silicon Crystal Ingot</a:t>
+            </a:r>
+          </a:p>
+        </p:txBody>
+      </p:sp>
+      <p:sp>
+        <p:nvSpPr>
+          <p:cNvPr id="3" name="Content Placeholder 2">
+            <a:extLst>
+              <a:ext uri="{FF2B5EF4-FFF2-40B4-BE49-F238E27FC236}">
+                <a16:creationId xmlns:a16="http://schemas.microsoft.com/office/drawing/2014/main" id="{D4AE0ACD-9F75-495E-B098-74A2BD405186}"/>
+              </a:ext>
+            </a:extLst>
+          </p:cNvPr>
+          <p:cNvSpPr>
+            <a:spLocks noGrp="1"/>
+          </p:cNvSpPr>
+          <p:nvPr>
+            <p:ph idx="1"/>
+          </p:nvPr>
+        </p:nvSpPr>
+        <p:spPr/>
+        <p:txBody>
+          <a:bodyPr/>
+          <a:lstStyle/>
+          <a:p>
+            <a:r>
+              <a:rPr lang="en-US" dirty="0"/>
+              <a:t>A rod composed of a silicon crystal between 8 to 12 inches in diameter and approximately 12 to 24 inches long, used as the start of the manufacturing process for Integrated Circuits.</a:t>
+            </a:r>
+          </a:p>
+          <a:p>
+            <a:r>
+              <a:rPr lang="en-US" dirty="0"/>
+              <a:t>These ingots, in the manufacturing process for IC’s, are finely sliced into </a:t>
+            </a:r>
+            <a:r>
+              <a:rPr lang="en-US" i="1" dirty="0"/>
+              <a:t>wafers</a:t>
+            </a:r>
+            <a:r>
+              <a:rPr lang="en-US" dirty="0"/>
+              <a:t> &lt;= 0.1 inches thick.</a:t>
+            </a:r>
+          </a:p>
+        </p:txBody>
+      </p:sp>
+      <p:pic>
+        <p:nvPicPr>
+          <p:cNvPr id="5" name="Picture 4" descr="Rod Representation">
+            <a:extLst>
+              <a:ext uri="{FF2B5EF4-FFF2-40B4-BE49-F238E27FC236}">
+                <a16:creationId xmlns:a16="http://schemas.microsoft.com/office/drawing/2014/main" id="{17664D57-BFAE-42DE-B029-C32DFD2E633D}"/>
+              </a:ext>
+            </a:extLst>
+          </p:cNvPr>
+          <p:cNvPicPr>
+            <a:picLocks noChangeAspect="1"/>
+          </p:cNvPicPr>
+          <p:nvPr/>
+        </p:nvPicPr>
+        <p:blipFill>
+          <a:blip r:embed="rId2">
+            <a:extLst>
+              <a:ext uri="{28A0092B-C50C-407E-A947-70E740481C1C}">
+                <a14:useLocalDpi xmlns:a14="http://schemas.microsoft.com/office/drawing/2010/main" val="0"/>
+              </a:ext>
+            </a:extLst>
+          </a:blip>
+          <a:stretch>
+            <a:fillRect/>
+          </a:stretch>
+        </p:blipFill>
+        <p:spPr>
+          <a:xfrm>
+            <a:off x="5967663" y="3616325"/>
+            <a:ext cx="4876800" cy="2695575"/>
+          </a:xfrm>
+          <a:prstGeom prst="rect">
+            <a:avLst/>
+          </a:prstGeom>
+        </p:spPr>
+      </p:pic>
+    </p:spTree>
+    <p:extLst>
+      <p:ext uri="{BB962C8B-B14F-4D97-AF65-F5344CB8AC3E}">
+        <p14:creationId xmlns:p14="http://schemas.microsoft.com/office/powerpoint/2010/main" val="687641206"/>
+      </p:ext>
+    </p:extLst>
+  </p:cSld>
+  <p:clrMapOvr>
+    <a:masterClrMapping/>
+  </p:clrMapOvr>
+</p:sld>
+</file>
+
+<file path=ppt/slides/slide13.xml><?xml version="1.0" encoding="utf-8"?>
+<p:sld xmlns:a="http://schemas.openxmlformats.org/drawingml/2006/main" xmlns:r="http://schemas.openxmlformats.org/officeDocument/2006/relationships" xmlns:p="http://schemas.openxmlformats.org/presentationml/2006/main">
+  <p:cSld>
+    <p:spTree>
+      <p:nvGrpSpPr>
+        <p:cNvPr id="1" name=""/>
+        <p:cNvGrpSpPr/>
+        <p:nvPr/>
+      </p:nvGrpSpPr>
+      <p:grpSpPr>
+        <a:xfrm>
+          <a:off x="0" y="0"/>
+          <a:ext cx="0" cy="0"/>
+          <a:chOff x="0" y="0"/>
+          <a:chExt cx="0" cy="0"/>
+        </a:xfrm>
+      </p:grpSpPr>
+      <p:sp>
+        <p:nvSpPr>
+          <p:cNvPr id="2" name="Title 1">
+            <a:extLst>
+              <a:ext uri="{FF2B5EF4-FFF2-40B4-BE49-F238E27FC236}">
+                <a16:creationId xmlns:a16="http://schemas.microsoft.com/office/drawing/2014/main" id="{E4EDD309-5007-47B1-AB3C-D68CF0E2D53E}"/>
+              </a:ext>
+            </a:extLst>
+          </p:cNvPr>
+          <p:cNvSpPr>
+            <a:spLocks noGrp="1"/>
+          </p:cNvSpPr>
+          <p:nvPr>
+            <p:ph type="title"/>
+          </p:nvPr>
+        </p:nvSpPr>
+        <p:spPr/>
+        <p:txBody>
+          <a:bodyPr/>
+          <a:lstStyle/>
+          <a:p>
+            <a:r>
+              <a:rPr lang="en-US" dirty="0"/>
+              <a:t>Wafer</a:t>
+            </a:r>
+          </a:p>
+        </p:txBody>
+      </p:sp>
+      <p:sp>
+        <p:nvSpPr>
+          <p:cNvPr id="3" name="Content Placeholder 2">
+            <a:extLst>
+              <a:ext uri="{FF2B5EF4-FFF2-40B4-BE49-F238E27FC236}">
+                <a16:creationId xmlns:a16="http://schemas.microsoft.com/office/drawing/2014/main" id="{D4AE0ACD-9F75-495E-B098-74A2BD405186}"/>
+              </a:ext>
+            </a:extLst>
+          </p:cNvPr>
+          <p:cNvSpPr>
+            <a:spLocks noGrp="1"/>
+          </p:cNvSpPr>
+          <p:nvPr>
+            <p:ph idx="1"/>
+          </p:nvPr>
+        </p:nvSpPr>
+        <p:spPr/>
+        <p:txBody>
+          <a:bodyPr/>
+          <a:lstStyle/>
+          <a:p>
+            <a:r>
+              <a:rPr lang="en-US" dirty="0"/>
+              <a:t>A slice from a silicon ingot, that is no more then 0.1 inches in thickness.</a:t>
+            </a:r>
+          </a:p>
+          <a:p>
+            <a:r>
+              <a:rPr lang="en-US" dirty="0"/>
+              <a:t>Used to create chips via a series of processing steps (20-40 average steps) from </a:t>
+            </a:r>
+            <a:r>
+              <a:rPr lang="en-US" i="1" dirty="0"/>
+              <a:t>blank wafers </a:t>
+            </a:r>
+            <a:r>
+              <a:rPr lang="en-US" dirty="0"/>
+              <a:t>to </a:t>
+            </a:r>
+            <a:r>
+              <a:rPr lang="en-US" i="1" dirty="0"/>
+              <a:t>patterned wafers</a:t>
+            </a:r>
+            <a:r>
+              <a:rPr lang="en-US" dirty="0"/>
+              <a:t>.</a:t>
+            </a:r>
+          </a:p>
+        </p:txBody>
+      </p:sp>
+      <p:pic>
+        <p:nvPicPr>
+          <p:cNvPr id="5" name="Picture 4">
+            <a:extLst>
+              <a:ext uri="{FF2B5EF4-FFF2-40B4-BE49-F238E27FC236}">
+                <a16:creationId xmlns:a16="http://schemas.microsoft.com/office/drawing/2014/main" id="{46F64DD6-6E09-49A1-9A3A-19DB0A324A1C}"/>
+              </a:ext>
+            </a:extLst>
+          </p:cNvPr>
+          <p:cNvPicPr>
+            <a:picLocks noChangeAspect="1"/>
+          </p:cNvPicPr>
+          <p:nvPr/>
+        </p:nvPicPr>
+        <p:blipFill>
+          <a:blip r:embed="rId2">
+            <a:extLst>
+              <a:ext uri="{28A0092B-C50C-407E-A947-70E740481C1C}">
+                <a14:useLocalDpi xmlns:a14="http://schemas.microsoft.com/office/drawing/2010/main" val="0"/>
+              </a:ext>
+            </a:extLst>
+          </a:blip>
+          <a:stretch>
+            <a:fillRect/>
+          </a:stretch>
+        </p:blipFill>
+        <p:spPr>
+          <a:xfrm>
+            <a:off x="838200" y="3545305"/>
+            <a:ext cx="4620126" cy="2968431"/>
+          </a:xfrm>
+          <a:prstGeom prst="rect">
+            <a:avLst/>
+          </a:prstGeom>
+        </p:spPr>
+      </p:pic>
+      <p:pic>
+        <p:nvPicPr>
+          <p:cNvPr id="7" name="Picture 6">
+            <a:extLst>
+              <a:ext uri="{FF2B5EF4-FFF2-40B4-BE49-F238E27FC236}">
+                <a16:creationId xmlns:a16="http://schemas.microsoft.com/office/drawing/2014/main" id="{6C6C5136-DC11-49B6-9927-78558F9F9043}"/>
+              </a:ext>
+            </a:extLst>
+          </p:cNvPr>
+          <p:cNvPicPr>
+            <a:picLocks noChangeAspect="1"/>
+          </p:cNvPicPr>
+          <p:nvPr/>
+        </p:nvPicPr>
+        <p:blipFill>
+          <a:blip r:embed="rId3">
+            <a:extLst>
+              <a:ext uri="{28A0092B-C50C-407E-A947-70E740481C1C}">
+                <a14:useLocalDpi xmlns:a14="http://schemas.microsoft.com/office/drawing/2010/main" val="0"/>
+              </a:ext>
+            </a:extLst>
+          </a:blip>
+          <a:stretch>
+            <a:fillRect/>
+          </a:stretch>
+        </p:blipFill>
+        <p:spPr>
+          <a:xfrm>
+            <a:off x="5649327" y="3545305"/>
+            <a:ext cx="6372020" cy="2342148"/>
+          </a:xfrm>
+          <a:prstGeom prst="rect">
+            <a:avLst/>
+          </a:prstGeom>
+        </p:spPr>
+      </p:pic>
+    </p:spTree>
+    <p:extLst>
+      <p:ext uri="{BB962C8B-B14F-4D97-AF65-F5344CB8AC3E}">
+        <p14:creationId xmlns:p14="http://schemas.microsoft.com/office/powerpoint/2010/main" val="839140339"/>
+      </p:ext>
+    </p:extLst>
+  </p:cSld>
+  <p:clrMapOvr>
+    <a:masterClrMapping/>
+  </p:clrMapOvr>
+</p:sld>
+</file>
+
+<file path=ppt/slides/slide14.xml><?xml version="1.0" encoding="utf-8"?>
+<p:sld xmlns:a="http://schemas.openxmlformats.org/drawingml/2006/main" xmlns:r="http://schemas.openxmlformats.org/officeDocument/2006/relationships" xmlns:p="http://schemas.openxmlformats.org/presentationml/2006/main">
+  <p:cSld>
+    <p:spTree>
+      <p:nvGrpSpPr>
+        <p:cNvPr id="1" name=""/>
+        <p:cNvGrpSpPr/>
+        <p:nvPr/>
+      </p:nvGrpSpPr>
+      <p:grpSpPr>
+        <a:xfrm>
+          <a:off x="0" y="0"/>
+          <a:ext cx="0" cy="0"/>
+          <a:chOff x="0" y="0"/>
+          <a:chExt cx="0" cy="0"/>
+        </a:xfrm>
+      </p:grpSpPr>
+      <p:sp>
+        <p:nvSpPr>
+          <p:cNvPr id="2" name="Title 1">
+            <a:extLst>
+              <a:ext uri="{FF2B5EF4-FFF2-40B4-BE49-F238E27FC236}">
+                <a16:creationId xmlns:a16="http://schemas.microsoft.com/office/drawing/2014/main" id="{E4EDD309-5007-47B1-AB3C-D68CF0E2D53E}"/>
+              </a:ext>
+            </a:extLst>
+          </p:cNvPr>
+          <p:cNvSpPr>
+            <a:spLocks noGrp="1"/>
+          </p:cNvSpPr>
+          <p:nvPr>
+            <p:ph type="title"/>
+          </p:nvPr>
+        </p:nvSpPr>
+        <p:spPr/>
+        <p:txBody>
+          <a:bodyPr/>
+          <a:lstStyle/>
+          <a:p>
+            <a:r>
+              <a:rPr lang="en-US" dirty="0"/>
+              <a:t>Defect</a:t>
+            </a:r>
+          </a:p>
+        </p:txBody>
+      </p:sp>
+      <p:sp>
+        <p:nvSpPr>
+          <p:cNvPr id="3" name="Content Placeholder 2">
+            <a:extLst>
+              <a:ext uri="{FF2B5EF4-FFF2-40B4-BE49-F238E27FC236}">
+                <a16:creationId xmlns:a16="http://schemas.microsoft.com/office/drawing/2014/main" id="{D4AE0ACD-9F75-495E-B098-74A2BD405186}"/>
+              </a:ext>
+            </a:extLst>
+          </p:cNvPr>
+          <p:cNvSpPr>
+            <a:spLocks noGrp="1"/>
+          </p:cNvSpPr>
+          <p:nvPr>
+            <p:ph idx="1"/>
+          </p:nvPr>
+        </p:nvSpPr>
+        <p:spPr/>
+        <p:txBody>
+          <a:bodyPr/>
+          <a:lstStyle/>
+          <a:p>
+            <a:r>
+              <a:rPr lang="en-US" dirty="0"/>
+              <a:t>During the processing steps between </a:t>
+            </a:r>
+            <a:r>
+              <a:rPr lang="en-US" i="1" dirty="0"/>
+              <a:t>blank wafers</a:t>
+            </a:r>
+            <a:r>
+              <a:rPr lang="en-US" dirty="0"/>
+              <a:t> and </a:t>
+            </a:r>
+            <a:r>
+              <a:rPr lang="en-US" i="1" dirty="0"/>
+              <a:t>patterned wafers</a:t>
+            </a:r>
+            <a:r>
+              <a:rPr lang="en-US" dirty="0"/>
+              <a:t>, a microscopic flaw in the original wafer or the processing steps can cause the </a:t>
+            </a:r>
+            <a:r>
+              <a:rPr lang="en-US" i="1" dirty="0"/>
+              <a:t>die </a:t>
+            </a:r>
+            <a:r>
+              <a:rPr lang="en-US" dirty="0"/>
+              <a:t>to fail.</a:t>
+            </a:r>
+          </a:p>
+          <a:p>
+            <a:r>
+              <a:rPr lang="en-US" dirty="0"/>
+              <a:t>These types of flaws, called defects, make it </a:t>
+            </a:r>
+            <a:r>
+              <a:rPr lang="en-US" i="1" dirty="0"/>
+              <a:t>virtually impossible</a:t>
+            </a:r>
+            <a:r>
+              <a:rPr lang="en-US" dirty="0"/>
+              <a:t> to produce a perfect wafer.</a:t>
+            </a:r>
+          </a:p>
+          <a:p>
+            <a:r>
+              <a:rPr lang="en-US" dirty="0"/>
+              <a:t>One way to cope with possible imperfections can be to place many independent components on a single wafer (Prompting the </a:t>
+            </a:r>
+            <a:r>
+              <a:rPr lang="en-US" i="1" dirty="0"/>
+              <a:t>patterned wafer</a:t>
+            </a:r>
+            <a:r>
+              <a:rPr lang="en-US" dirty="0"/>
+              <a:t> to be chopped </a:t>
+            </a:r>
+            <a:r>
+              <a:rPr lang="en-US" i="1" dirty="0"/>
+              <a:t>into</a:t>
+            </a:r>
+            <a:r>
+              <a:rPr lang="en-US" dirty="0"/>
+              <a:t> these components.</a:t>
+            </a:r>
+          </a:p>
+        </p:txBody>
+      </p:sp>
+    </p:spTree>
+    <p:extLst>
+      <p:ext uri="{BB962C8B-B14F-4D97-AF65-F5344CB8AC3E}">
+        <p14:creationId xmlns:p14="http://schemas.microsoft.com/office/powerpoint/2010/main" val="4003186184"/>
+      </p:ext>
+    </p:extLst>
+  </p:cSld>
+  <p:clrMapOvr>
+    <a:masterClrMapping/>
+  </p:clrMapOvr>
+</p:sld>
+</file>
+
+<file path=ppt/slides/slide15.xml><?xml version="1.0" encoding="utf-8"?>
+<p:sld xmlns:a="http://schemas.openxmlformats.org/drawingml/2006/main" xmlns:r="http://schemas.openxmlformats.org/officeDocument/2006/relationships" xmlns:p="http://schemas.openxmlformats.org/presentationml/2006/main">
+  <p:cSld>
+    <p:spTree>
+      <p:nvGrpSpPr>
+        <p:cNvPr id="1" name=""/>
+        <p:cNvGrpSpPr/>
+        <p:nvPr/>
+      </p:nvGrpSpPr>
+      <p:grpSpPr>
+        <a:xfrm>
+          <a:off x="0" y="0"/>
+          <a:ext cx="0" cy="0"/>
+          <a:chOff x="0" y="0"/>
+          <a:chExt cx="0" cy="0"/>
+        </a:xfrm>
+      </p:grpSpPr>
+      <p:sp>
+        <p:nvSpPr>
+          <p:cNvPr id="2" name="Title 1">
+            <a:extLst>
+              <a:ext uri="{FF2B5EF4-FFF2-40B4-BE49-F238E27FC236}">
+                <a16:creationId xmlns:a16="http://schemas.microsoft.com/office/drawing/2014/main" id="{E4EDD309-5007-47B1-AB3C-D68CF0E2D53E}"/>
+              </a:ext>
+            </a:extLst>
+          </p:cNvPr>
+          <p:cNvSpPr>
+            <a:spLocks noGrp="1"/>
+          </p:cNvSpPr>
+          <p:nvPr>
+            <p:ph type="title"/>
+          </p:nvPr>
+        </p:nvSpPr>
+        <p:spPr/>
+        <p:txBody>
+          <a:bodyPr/>
+          <a:lstStyle/>
+          <a:p>
+            <a:r>
+              <a:rPr lang="en-US" dirty="0"/>
+              <a:t>Representation -&gt; Wafer Defect</a:t>
+            </a:r>
+          </a:p>
+        </p:txBody>
+      </p:sp>
+      <p:pic>
+        <p:nvPicPr>
+          <p:cNvPr id="5" name="Content Placeholder 4">
+            <a:extLst>
+              <a:ext uri="{FF2B5EF4-FFF2-40B4-BE49-F238E27FC236}">
+                <a16:creationId xmlns:a16="http://schemas.microsoft.com/office/drawing/2014/main" id="{FC1A5CBB-C012-4934-8518-E0E1901A2FEE}"/>
+              </a:ext>
+            </a:extLst>
+          </p:cNvPr>
+          <p:cNvPicPr>
+            <a:picLocks noGrp="1" noChangeAspect="1"/>
+          </p:cNvPicPr>
+          <p:nvPr>
+            <p:ph idx="1"/>
+          </p:nvPr>
+        </p:nvPicPr>
+        <p:blipFill>
+          <a:blip r:embed="rId2">
+            <a:extLst>
+              <a:ext uri="{28A0092B-C50C-407E-A947-70E740481C1C}">
+                <a14:useLocalDpi xmlns:a14="http://schemas.microsoft.com/office/drawing/2010/main" val="0"/>
+              </a:ext>
+            </a:extLst>
+          </a:blip>
+          <a:stretch>
+            <a:fillRect/>
+          </a:stretch>
+        </p:blipFill>
+        <p:spPr>
+          <a:xfrm>
+            <a:off x="1693065" y="1825625"/>
+            <a:ext cx="8805869" cy="4351338"/>
+          </a:xfrm>
+        </p:spPr>
+      </p:pic>
+    </p:spTree>
+    <p:extLst>
+      <p:ext uri="{BB962C8B-B14F-4D97-AF65-F5344CB8AC3E}">
+        <p14:creationId xmlns:p14="http://schemas.microsoft.com/office/powerpoint/2010/main" val="1105162607"/>
+      </p:ext>
+    </p:extLst>
+  </p:cSld>
+  <p:clrMapOvr>
+    <a:masterClrMapping/>
+  </p:clrMapOvr>
+</p:sld>
+</file>
+
+<file path=ppt/slides/slide16.xml><?xml version="1.0" encoding="utf-8"?>
+<p:sld xmlns:a="http://schemas.openxmlformats.org/drawingml/2006/main" xmlns:r="http://schemas.openxmlformats.org/officeDocument/2006/relationships" xmlns:p="http://schemas.openxmlformats.org/presentationml/2006/main">
+  <p:cSld>
+    <p:spTree>
+      <p:nvGrpSpPr>
+        <p:cNvPr id="1" name=""/>
+        <p:cNvGrpSpPr/>
+        <p:nvPr/>
+      </p:nvGrpSpPr>
+      <p:grpSpPr>
+        <a:xfrm>
+          <a:off x="0" y="0"/>
+          <a:ext cx="0" cy="0"/>
+          <a:chOff x="0" y="0"/>
+          <a:chExt cx="0" cy="0"/>
+        </a:xfrm>
+      </p:grpSpPr>
+      <p:sp>
+        <p:nvSpPr>
+          <p:cNvPr id="2" name="Title 1">
+            <a:extLst>
+              <a:ext uri="{FF2B5EF4-FFF2-40B4-BE49-F238E27FC236}">
+                <a16:creationId xmlns:a16="http://schemas.microsoft.com/office/drawing/2014/main" id="{E4EDD309-5007-47B1-AB3C-D68CF0E2D53E}"/>
+              </a:ext>
+            </a:extLst>
+          </p:cNvPr>
+          <p:cNvSpPr>
+            <a:spLocks noGrp="1"/>
+          </p:cNvSpPr>
+          <p:nvPr>
+            <p:ph type="title"/>
+          </p:nvPr>
+        </p:nvSpPr>
+        <p:spPr/>
+        <p:txBody>
+          <a:bodyPr/>
+          <a:lstStyle/>
+          <a:p>
+            <a:r>
+              <a:rPr lang="en-US" dirty="0"/>
+              <a:t>Die </a:t>
+            </a:r>
+            <a:r>
+              <a:rPr lang="en-US" sz="2400" dirty="0"/>
+              <a:t>(Informally known as Chips)</a:t>
+            </a:r>
+          </a:p>
+        </p:txBody>
+      </p:sp>
+      <p:sp>
+        <p:nvSpPr>
+          <p:cNvPr id="3" name="Content Placeholder 2">
+            <a:extLst>
+              <a:ext uri="{FF2B5EF4-FFF2-40B4-BE49-F238E27FC236}">
+                <a16:creationId xmlns:a16="http://schemas.microsoft.com/office/drawing/2014/main" id="{D4AE0ACD-9F75-495E-B098-74A2BD405186}"/>
+              </a:ext>
+            </a:extLst>
+          </p:cNvPr>
+          <p:cNvSpPr>
+            <a:spLocks noGrp="1"/>
+          </p:cNvSpPr>
+          <p:nvPr>
+            <p:ph idx="1"/>
+          </p:nvPr>
+        </p:nvSpPr>
+        <p:spPr/>
+        <p:txBody>
+          <a:bodyPr/>
+          <a:lstStyle/>
+          <a:p>
+            <a:r>
+              <a:rPr lang="en-US" dirty="0"/>
+              <a:t>When the </a:t>
+            </a:r>
+            <a:r>
+              <a:rPr lang="en-US" i="1" dirty="0"/>
+              <a:t>patterned wafer</a:t>
+            </a:r>
+            <a:r>
+              <a:rPr lang="en-US" dirty="0"/>
+              <a:t> is chopped, it can also be referred to as being </a:t>
+            </a:r>
+            <a:r>
+              <a:rPr lang="en-US" i="1" dirty="0"/>
+              <a:t>diced</a:t>
+            </a:r>
+            <a:r>
+              <a:rPr lang="en-US" dirty="0"/>
+              <a:t>.</a:t>
+            </a:r>
+          </a:p>
+          <a:p>
+            <a:r>
+              <a:rPr lang="en-US" dirty="0"/>
+              <a:t>The resulting rectangular sections that are cut from the </a:t>
+            </a:r>
+            <a:r>
+              <a:rPr lang="en-US" i="1" dirty="0"/>
+              <a:t>wafer</a:t>
+            </a:r>
+            <a:r>
+              <a:rPr lang="en-US" dirty="0"/>
+              <a:t> are known as </a:t>
+            </a:r>
+            <a:r>
+              <a:rPr lang="en-US" i="1" dirty="0"/>
+              <a:t>dies</a:t>
+            </a:r>
+            <a:r>
+              <a:rPr lang="en-US" dirty="0"/>
+              <a:t>, otherwise known as </a:t>
+            </a:r>
+            <a:r>
+              <a:rPr lang="en-US" i="1" dirty="0"/>
+              <a:t>chips.</a:t>
+            </a:r>
+          </a:p>
+        </p:txBody>
+      </p:sp>
+      <p:pic>
+        <p:nvPicPr>
+          <p:cNvPr id="5" name="Picture 4">
+            <a:extLst>
+              <a:ext uri="{FF2B5EF4-FFF2-40B4-BE49-F238E27FC236}">
+                <a16:creationId xmlns:a16="http://schemas.microsoft.com/office/drawing/2014/main" id="{C0A853EF-E3EA-4CDC-94FB-42CB1528C23C}"/>
+              </a:ext>
+            </a:extLst>
+          </p:cNvPr>
+          <p:cNvPicPr>
+            <a:picLocks noChangeAspect="1"/>
+          </p:cNvPicPr>
+          <p:nvPr/>
+        </p:nvPicPr>
+        <p:blipFill>
+          <a:blip r:embed="rId2">
+            <a:extLst>
+              <a:ext uri="{28A0092B-C50C-407E-A947-70E740481C1C}">
+                <a14:useLocalDpi xmlns:a14="http://schemas.microsoft.com/office/drawing/2010/main" val="0"/>
+              </a:ext>
+            </a:extLst>
+          </a:blip>
+          <a:stretch>
+            <a:fillRect/>
+          </a:stretch>
+        </p:blipFill>
+        <p:spPr>
+          <a:xfrm>
+            <a:off x="8229600" y="4017378"/>
+            <a:ext cx="2475497" cy="2475497"/>
+          </a:xfrm>
+          <a:prstGeom prst="rect">
+            <a:avLst/>
+          </a:prstGeom>
+        </p:spPr>
+      </p:pic>
+    </p:spTree>
+    <p:extLst>
+      <p:ext uri="{BB962C8B-B14F-4D97-AF65-F5344CB8AC3E}">
+        <p14:creationId xmlns:p14="http://schemas.microsoft.com/office/powerpoint/2010/main" val="2829591715"/>
+      </p:ext>
+    </p:extLst>
+  </p:cSld>
+  <p:clrMapOvr>
+    <a:masterClrMapping/>
+  </p:clrMapOvr>
+</p:sld>
+</file>
+
+<file path=ppt/slides/slide17.xml><?xml version="1.0" encoding="utf-8"?>
+<p:sld xmlns:a="http://schemas.openxmlformats.org/drawingml/2006/main" xmlns:r="http://schemas.openxmlformats.org/officeDocument/2006/relationships" xmlns:p="http://schemas.openxmlformats.org/presentationml/2006/main">
+  <p:cSld>
+    <p:spTree>
+      <p:nvGrpSpPr>
+        <p:cNvPr id="1" name=""/>
+        <p:cNvGrpSpPr/>
+        <p:nvPr/>
+      </p:nvGrpSpPr>
+      <p:grpSpPr>
+        <a:xfrm>
+          <a:off x="0" y="0"/>
+          <a:ext cx="0" cy="0"/>
+          <a:chOff x="0" y="0"/>
+          <a:chExt cx="0" cy="0"/>
+        </a:xfrm>
+      </p:grpSpPr>
+      <p:sp>
+        <p:nvSpPr>
+          <p:cNvPr id="2" name="Title 1">
+            <a:extLst>
+              <a:ext uri="{FF2B5EF4-FFF2-40B4-BE49-F238E27FC236}">
+                <a16:creationId xmlns:a16="http://schemas.microsoft.com/office/drawing/2014/main" id="{E4EDD309-5007-47B1-AB3C-D68CF0E2D53E}"/>
+              </a:ext>
+            </a:extLst>
+          </p:cNvPr>
+          <p:cNvSpPr>
+            <a:spLocks noGrp="1"/>
+          </p:cNvSpPr>
+          <p:nvPr>
+            <p:ph type="title"/>
+          </p:nvPr>
+        </p:nvSpPr>
+        <p:spPr/>
+        <p:txBody>
+          <a:bodyPr/>
+          <a:lstStyle/>
+          <a:p>
+            <a:r>
+              <a:rPr lang="en-US" dirty="0"/>
+              <a:t>Yield</a:t>
+            </a:r>
+          </a:p>
+        </p:txBody>
+      </p:sp>
+      <p:sp>
+        <p:nvSpPr>
+          <p:cNvPr id="3" name="Content Placeholder 2">
+            <a:extLst>
+              <a:ext uri="{FF2B5EF4-FFF2-40B4-BE49-F238E27FC236}">
+                <a16:creationId xmlns:a16="http://schemas.microsoft.com/office/drawing/2014/main" id="{D4AE0ACD-9F75-495E-B098-74A2BD405186}"/>
+              </a:ext>
+            </a:extLst>
+          </p:cNvPr>
+          <p:cNvSpPr>
+            <a:spLocks noGrp="1"/>
+          </p:cNvSpPr>
+          <p:nvPr>
+            <p:ph idx="1"/>
+          </p:nvPr>
+        </p:nvSpPr>
+        <p:spPr/>
+        <p:txBody>
+          <a:bodyPr/>
+          <a:lstStyle/>
+          <a:p>
+            <a:r>
+              <a:rPr lang="en-US" dirty="0"/>
+              <a:t>From </a:t>
+            </a:r>
+            <a:r>
+              <a:rPr lang="en-US" i="1" dirty="0"/>
+              <a:t>dicing</a:t>
+            </a:r>
+            <a:r>
+              <a:rPr lang="en-US" dirty="0"/>
+              <a:t>, doing so enables you to discard the imperfect/flawed </a:t>
+            </a:r>
+            <a:r>
+              <a:rPr lang="en-US" i="1" dirty="0"/>
+              <a:t>dies</a:t>
+            </a:r>
+            <a:r>
+              <a:rPr lang="en-US" dirty="0"/>
+              <a:t> instead of the entire wafer.</a:t>
+            </a:r>
+          </a:p>
+          <a:p>
+            <a:r>
+              <a:rPr lang="en-US" dirty="0"/>
+              <a:t>The comparison between the </a:t>
+            </a:r>
+            <a:r>
+              <a:rPr lang="en-US" i="1" dirty="0"/>
+              <a:t>dies</a:t>
+            </a:r>
+            <a:r>
+              <a:rPr lang="en-US" dirty="0"/>
+              <a:t> can also be referred to as the </a:t>
+            </a:r>
+            <a:r>
+              <a:rPr lang="en-US" i="1" dirty="0"/>
+              <a:t>yield</a:t>
+            </a:r>
+            <a:r>
+              <a:rPr lang="en-US" dirty="0"/>
+              <a:t> of a process, defined as the percentage/ratio between the good </a:t>
+            </a:r>
+            <a:r>
+              <a:rPr lang="en-US" i="1" dirty="0"/>
+              <a:t>dies</a:t>
+            </a:r>
+            <a:r>
+              <a:rPr lang="en-US" dirty="0"/>
+              <a:t> from the total </a:t>
+            </a:r>
+            <a:r>
+              <a:rPr lang="en-US" i="1" dirty="0"/>
+              <a:t>dies</a:t>
+            </a:r>
+            <a:r>
+              <a:rPr lang="en-US" dirty="0"/>
+              <a:t> on the </a:t>
+            </a:r>
+            <a:r>
+              <a:rPr lang="en-US" i="1" dirty="0"/>
+              <a:t>wafer</a:t>
+            </a:r>
+            <a:r>
+              <a:rPr lang="en-US" dirty="0"/>
+              <a:t> originally.</a:t>
+            </a:r>
+          </a:p>
+        </p:txBody>
+      </p:sp>
+    </p:spTree>
+    <p:extLst>
+      <p:ext uri="{BB962C8B-B14F-4D97-AF65-F5344CB8AC3E}">
+        <p14:creationId xmlns:p14="http://schemas.microsoft.com/office/powerpoint/2010/main" val="3732068591"/>
+      </p:ext>
+    </p:extLst>
+  </p:cSld>
+  <p:clrMapOvr>
+    <a:masterClrMapping/>
+  </p:clrMapOvr>
+</p:sld>
+</file>
+
+<file path=ppt/slides/slide18.xml><?xml version="1.0" encoding="utf-8"?>
+<p:sld xmlns:a="http://schemas.openxmlformats.org/drawingml/2006/main" xmlns:r="http://schemas.openxmlformats.org/officeDocument/2006/relationships" xmlns:p="http://schemas.openxmlformats.org/presentationml/2006/main">
+  <p:cSld>
+    <p:spTree>
+      <p:nvGrpSpPr>
+        <p:cNvPr id="1" name=""/>
+        <p:cNvGrpSpPr/>
+        <p:nvPr/>
+      </p:nvGrpSpPr>
+      <p:grpSpPr>
+        <a:xfrm>
+          <a:off x="0" y="0"/>
+          <a:ext cx="0" cy="0"/>
+          <a:chOff x="0" y="0"/>
+          <a:chExt cx="0" cy="0"/>
+        </a:xfrm>
+      </p:grpSpPr>
+      <p:sp>
+        <p:nvSpPr>
+          <p:cNvPr id="2" name="Title 1">
+            <a:extLst>
+              <a:ext uri="{FF2B5EF4-FFF2-40B4-BE49-F238E27FC236}">
                 <a16:creationId xmlns:a16="http://schemas.microsoft.com/office/drawing/2014/main" id="{E4EDD309-5007-47B1-AB3C-D68CF0E2D53E}"/>
               </a:ext>
             </a:extLst>
@@ -8833,34 +9945,6 @@
       </p:grpSpPr>
       <p:sp>
         <p:nvSpPr>
-          <p:cNvPr id="2" name="Title 1">
-            <a:extLst>
-              <a:ext uri="{FF2B5EF4-FFF2-40B4-BE49-F238E27FC236}">
-                <a16:creationId xmlns:a16="http://schemas.microsoft.com/office/drawing/2014/main" id="{E4EDD309-5007-47B1-AB3C-D68CF0E2D53E}"/>
-              </a:ext>
-            </a:extLst>
-          </p:cNvPr>
-          <p:cNvSpPr>
-            <a:spLocks noGrp="1"/>
-          </p:cNvSpPr>
-          <p:nvPr>
-            <p:ph type="title"/>
-          </p:nvPr>
-        </p:nvSpPr>
-        <p:spPr/>
-        <p:txBody>
-          <a:bodyPr/>
-          <a:lstStyle/>
-          <a:p>
-            <a:r>
-              <a:rPr lang="en-US" dirty="0"/>
-              <a:t>Introduction</a:t>
-            </a:r>
-          </a:p>
-        </p:txBody>
-      </p:sp>
-      <p:sp>
-        <p:nvSpPr>
           <p:cNvPr id="3" name="Content Placeholder 2">
             <a:extLst>
               <a:ext uri="{FF2B5EF4-FFF2-40B4-BE49-F238E27FC236}">
@@ -8880,10 +9964,33 @@
           <a:bodyPr/>
           <a:lstStyle/>
           <a:p>
+            <a:pPr marL="0" indent="0" algn="ctr">
+              <a:buNone/>
+            </a:pPr>
+            <a:endParaRPr lang="en-US" dirty="0"/>
+          </a:p>
+          <a:p>
+            <a:pPr marL="0" indent="0" algn="ctr">
+              <a:buNone/>
+            </a:pPr>
             <a:r>
               <a:rPr lang="en-US" dirty="0"/>
-              <a:t>&lt;…&gt;</a:t>
-            </a:r>
+              <a:t>“The whole is greater than the sum of its parts.”</a:t>
+            </a:r>
+          </a:p>
+          <a:p>
+            <a:pPr marL="0" indent="0" algn="ctr">
+              <a:buNone/>
+            </a:pPr>
+            <a:r>
+              <a:rPr lang="en-US" dirty="0"/>
+              <a:t>- </a:t>
+            </a:r>
+            <a:r>
+              <a:rPr lang="en-US" i="1" dirty="0"/>
+              <a:t>Aristotle (?)</a:t>
+            </a:r>
+            <a:endParaRPr lang="en-US" dirty="0"/>
           </a:p>
         </p:txBody>
       </p:sp>
@@ -8938,7 +10045,10 @@
           <a:bodyPr/>
           <a:lstStyle/>
           <a:p>
-            <a:endParaRPr lang="en-US" dirty="0"/>
+            <a:r>
+              <a:rPr lang="en-US" dirty="0"/>
+              <a:t>A bit of history</a:t>
+            </a:r>
           </a:p>
         </p:txBody>
       </p:sp>
@@ -8963,14 +10073,35 @@
           <a:bodyPr/>
           <a:lstStyle/>
           <a:p>
+            <a:r>
+              <a:rPr lang="en-US" dirty="0"/>
+              <a:t>“Computer” originally referred to humans; “one who computes”</a:t>
+            </a:r>
+          </a:p>
+          <a:p>
             <a:endParaRPr lang="en-US" dirty="0"/>
+          </a:p>
+          <a:p>
+            <a:r>
+              <a:rPr lang="en-US" dirty="0"/>
+              <a:t>Abacus</a:t>
+            </a:r>
+          </a:p>
+          <a:p>
+            <a:endParaRPr lang="en-US" dirty="0"/>
+          </a:p>
+          <a:p>
+            <a:r>
+              <a:rPr lang="en-US" dirty="0"/>
+              <a:t>ENIAC</a:t>
+            </a:r>
           </a:p>
         </p:txBody>
       </p:sp>
     </p:spTree>
     <p:extLst>
       <p:ext uri="{BB962C8B-B14F-4D97-AF65-F5344CB8AC3E}">
-        <p14:creationId xmlns:p14="http://schemas.microsoft.com/office/powerpoint/2010/main" val="3967968521"/>
+        <p14:creationId xmlns:p14="http://schemas.microsoft.com/office/powerpoint/2010/main" val="3582541595"/>
       </p:ext>
     </p:extLst>
   </p:cSld>
@@ -9020,64 +10151,22 @@
           <a:p>
             <a:r>
               <a:rPr lang="en-US" dirty="0"/>
-              <a:t>Silicon Crystal Ingot</a:t>
-            </a:r>
-          </a:p>
-        </p:txBody>
-      </p:sp>
-      <p:sp>
-        <p:nvSpPr>
-          <p:cNvPr id="3" name="Content Placeholder 2">
-            <a:extLst>
-              <a:ext uri="{FF2B5EF4-FFF2-40B4-BE49-F238E27FC236}">
-                <a16:creationId xmlns:a16="http://schemas.microsoft.com/office/drawing/2014/main" id="{D4AE0ACD-9F75-495E-B098-74A2BD405186}"/>
-              </a:ext>
-            </a:extLst>
-          </p:cNvPr>
-          <p:cNvSpPr>
-            <a:spLocks noGrp="1"/>
-          </p:cNvSpPr>
-          <p:nvPr>
-            <p:ph idx="1"/>
-          </p:nvPr>
-        </p:nvSpPr>
-        <p:spPr/>
-        <p:txBody>
-          <a:bodyPr/>
-          <a:lstStyle/>
-          <a:p>
-            <a:r>
-              <a:rPr lang="en-US" dirty="0"/>
-              <a:t>A rod composed of a silicon crystal between 8 to 12 inches in diameter and approximately 12 to 24 inches long, used as the start of the manufacturing process for Integrated Circuits.</a:t>
-            </a:r>
-          </a:p>
-          <a:p>
-            <a:r>
-              <a:rPr lang="en-US" dirty="0"/>
-              <a:t>These ingots, in the manufacturing process for IC’s, are finely sliced into </a:t>
-            </a:r>
-            <a:r>
-              <a:rPr lang="en-US" i="1" dirty="0"/>
-              <a:t>wafers</a:t>
-            </a:r>
-            <a:r>
-              <a:rPr lang="en-US" dirty="0"/>
-              <a:t> &lt;= 0.1 inches thick.</a:t>
+              <a:t>A bit of history</a:t>
             </a:r>
           </a:p>
         </p:txBody>
       </p:sp>
       <p:pic>
         <p:nvPicPr>
-          <p:cNvPr id="5" name="Picture 4" descr="Rod Representation">
-            <a:extLst>
-              <a:ext uri="{FF2B5EF4-FFF2-40B4-BE49-F238E27FC236}">
-                <a16:creationId xmlns:a16="http://schemas.microsoft.com/office/drawing/2014/main" id="{17664D57-BFAE-42DE-B029-C32DFD2E633D}"/>
+          <p:cNvPr id="1026" name="Picture 2">
+            <a:extLst>
+              <a:ext uri="{FF2B5EF4-FFF2-40B4-BE49-F238E27FC236}">
+                <a16:creationId xmlns:a16="http://schemas.microsoft.com/office/drawing/2014/main" id="{0255B5ED-CDCE-4575-9F83-A79CE619AD32}"/>
               </a:ext>
             </a:extLst>
           </p:cNvPr>
           <p:cNvPicPr>
-            <a:picLocks noChangeAspect="1"/>
+            <a:picLocks noChangeAspect="1" noChangeArrowheads="1"/>
           </p:cNvPicPr>
           <p:nvPr/>
         </p:nvPicPr>
@@ -9089,24 +10178,221 @@
               </a:ext>
             </a:extLst>
           </a:blip>
+          <a:srcRect/>
           <a:stretch>
             <a:fillRect/>
           </a:stretch>
         </p:blipFill>
-        <p:spPr>
+        <p:spPr bwMode="auto">
           <a:xfrm>
-            <a:off x="5967663" y="3616325"/>
-            <a:ext cx="4876800" cy="2695575"/>
+            <a:off x="838200" y="2358998"/>
+            <a:ext cx="2737210" cy="2140001"/>
           </a:xfrm>
           <a:prstGeom prst="rect">
             <a:avLst/>
           </a:prstGeom>
+          <a:noFill/>
+          <a:extLst>
+            <a:ext uri="{909E8E84-426E-40DD-AFC4-6F175D3DCCD1}">
+              <a14:hiddenFill xmlns:a14="http://schemas.microsoft.com/office/drawing/2010/main">
+                <a:solidFill>
+                  <a:srgbClr val="FFFFFF"/>
+                </a:solidFill>
+              </a14:hiddenFill>
+            </a:ext>
+          </a:extLst>
         </p:spPr>
       </p:pic>
+      <p:pic>
+        <p:nvPicPr>
+          <p:cNvPr id="1028" name="Picture 4">
+            <a:extLst>
+              <a:ext uri="{FF2B5EF4-FFF2-40B4-BE49-F238E27FC236}">
+                <a16:creationId xmlns:a16="http://schemas.microsoft.com/office/drawing/2014/main" id="{E2CCC2AD-5FCA-4C3D-968B-DABA2B39D954}"/>
+              </a:ext>
+            </a:extLst>
+          </p:cNvPr>
+          <p:cNvPicPr>
+            <a:picLocks noChangeAspect="1" noChangeArrowheads="1"/>
+          </p:cNvPicPr>
+          <p:nvPr/>
+        </p:nvPicPr>
+        <p:blipFill>
+          <a:blip r:embed="rId3">
+            <a:extLst>
+              <a:ext uri="{28A0092B-C50C-407E-A947-70E740481C1C}">
+                <a14:useLocalDpi xmlns:a14="http://schemas.microsoft.com/office/drawing/2010/main" val="0"/>
+              </a:ext>
+            </a:extLst>
+          </a:blip>
+          <a:srcRect/>
+          <a:stretch>
+            <a:fillRect/>
+          </a:stretch>
+        </p:blipFill>
+        <p:spPr bwMode="auto">
+          <a:xfrm>
+            <a:off x="4727394" y="2401709"/>
+            <a:ext cx="2737211" cy="2054581"/>
+          </a:xfrm>
+          <a:prstGeom prst="rect">
+            <a:avLst/>
+          </a:prstGeom>
+          <a:noFill/>
+          <a:extLst>
+            <a:ext uri="{909E8E84-426E-40DD-AFC4-6F175D3DCCD1}">
+              <a14:hiddenFill xmlns:a14="http://schemas.microsoft.com/office/drawing/2010/main">
+                <a:solidFill>
+                  <a:srgbClr val="FFFFFF"/>
+                </a:solidFill>
+              </a14:hiddenFill>
+            </a:ext>
+          </a:extLst>
+        </p:spPr>
+      </p:pic>
+      <p:pic>
+        <p:nvPicPr>
+          <p:cNvPr id="1030" name="Picture 6">
+            <a:extLst>
+              <a:ext uri="{FF2B5EF4-FFF2-40B4-BE49-F238E27FC236}">
+                <a16:creationId xmlns:a16="http://schemas.microsoft.com/office/drawing/2014/main" id="{08A51831-DDDC-4751-8ED5-553F25E8B4C5}"/>
+              </a:ext>
+            </a:extLst>
+          </p:cNvPr>
+          <p:cNvPicPr>
+            <a:picLocks noChangeAspect="1" noChangeArrowheads="1"/>
+          </p:cNvPicPr>
+          <p:nvPr/>
+        </p:nvPicPr>
+        <p:blipFill>
+          <a:blip r:embed="rId4">
+            <a:extLst>
+              <a:ext uri="{28A0092B-C50C-407E-A947-70E740481C1C}">
+                <a14:useLocalDpi xmlns:a14="http://schemas.microsoft.com/office/drawing/2010/main" val="0"/>
+              </a:ext>
+            </a:extLst>
+          </a:blip>
+          <a:srcRect/>
+          <a:stretch>
+            <a:fillRect/>
+          </a:stretch>
+        </p:blipFill>
+        <p:spPr bwMode="auto">
+          <a:xfrm>
+            <a:off x="8616589" y="2404537"/>
+            <a:ext cx="2737210" cy="2061497"/>
+          </a:xfrm>
+          <a:prstGeom prst="rect">
+            <a:avLst/>
+          </a:prstGeom>
+          <a:noFill/>
+          <a:extLst>
+            <a:ext uri="{909E8E84-426E-40DD-AFC4-6F175D3DCCD1}">
+              <a14:hiddenFill xmlns:a14="http://schemas.microsoft.com/office/drawing/2010/main">
+                <a:solidFill>
+                  <a:srgbClr val="FFFFFF"/>
+                </a:solidFill>
+              </a14:hiddenFill>
+            </a:ext>
+          </a:extLst>
+        </p:spPr>
+      </p:pic>
+      <p:sp>
+        <p:nvSpPr>
+          <p:cNvPr id="4" name="Arrow: Right 3">
+            <a:extLst>
+              <a:ext uri="{FF2B5EF4-FFF2-40B4-BE49-F238E27FC236}">
+                <a16:creationId xmlns:a16="http://schemas.microsoft.com/office/drawing/2014/main" id="{74BDA707-86F6-45AC-B5BE-A40C4AAE107F}"/>
+              </a:ext>
+            </a:extLst>
+          </p:cNvPr>
+          <p:cNvSpPr/>
+          <p:nvPr/>
+        </p:nvSpPr>
+        <p:spPr>
+          <a:xfrm>
+            <a:off x="3890145" y="3233055"/>
+            <a:ext cx="522514" cy="391886"/>
+          </a:xfrm>
+          <a:prstGeom prst="rightArrow">
+            <a:avLst/>
+          </a:prstGeom>
+        </p:spPr>
+        <p:style>
+          <a:lnRef idx="2">
+            <a:schemeClr val="accent1">
+              <a:shade val="50000"/>
+            </a:schemeClr>
+          </a:lnRef>
+          <a:fillRef idx="1">
+            <a:schemeClr val="accent1"/>
+          </a:fillRef>
+          <a:effectRef idx="0">
+            <a:schemeClr val="accent1"/>
+          </a:effectRef>
+          <a:fontRef idx="minor">
+            <a:schemeClr val="lt1"/>
+          </a:fontRef>
+        </p:style>
+        <p:txBody>
+          <a:bodyPr rtlCol="0" anchor="ctr"/>
+          <a:lstStyle/>
+          <a:p>
+            <a:pPr algn="ctr"/>
+            <a:endParaRPr lang="en-US"/>
+          </a:p>
+        </p:txBody>
+      </p:sp>
+      <p:sp>
+        <p:nvSpPr>
+          <p:cNvPr id="8" name="Arrow: Right 7">
+            <a:extLst>
+              <a:ext uri="{FF2B5EF4-FFF2-40B4-BE49-F238E27FC236}">
+                <a16:creationId xmlns:a16="http://schemas.microsoft.com/office/drawing/2014/main" id="{F362A75F-994F-45CC-811B-DD6A705A7FA0}"/>
+              </a:ext>
+            </a:extLst>
+          </p:cNvPr>
+          <p:cNvSpPr/>
+          <p:nvPr/>
+        </p:nvSpPr>
+        <p:spPr>
+          <a:xfrm>
+            <a:off x="7779340" y="3233055"/>
+            <a:ext cx="522514" cy="391886"/>
+          </a:xfrm>
+          <a:prstGeom prst="rightArrow">
+            <a:avLst/>
+          </a:prstGeom>
+        </p:spPr>
+        <p:style>
+          <a:lnRef idx="2">
+            <a:schemeClr val="accent1">
+              <a:shade val="50000"/>
+            </a:schemeClr>
+          </a:lnRef>
+          <a:fillRef idx="1">
+            <a:schemeClr val="accent1"/>
+          </a:fillRef>
+          <a:effectRef idx="0">
+            <a:schemeClr val="accent1"/>
+          </a:effectRef>
+          <a:fontRef idx="minor">
+            <a:schemeClr val="lt1"/>
+          </a:fontRef>
+        </p:style>
+        <p:txBody>
+          <a:bodyPr rtlCol="0" anchor="ctr"/>
+          <a:lstStyle/>
+          <a:p>
+            <a:pPr algn="ctr"/>
+            <a:endParaRPr lang="en-US"/>
+          </a:p>
+        </p:txBody>
+      </p:sp>
     </p:spTree>
     <p:extLst>
       <p:ext uri="{BB962C8B-B14F-4D97-AF65-F5344CB8AC3E}">
-        <p14:creationId xmlns:p14="http://schemas.microsoft.com/office/powerpoint/2010/main" val="687641206"/>
+        <p14:creationId xmlns:p14="http://schemas.microsoft.com/office/powerpoint/2010/main" val="3608436697"/>
       </p:ext>
     </p:extLst>
   </p:cSld>
@@ -9156,137 +10442,426 @@
           <a:p>
             <a:r>
               <a:rPr lang="en-US" dirty="0"/>
-              <a:t>Wafer</a:t>
+              <a:t>Progress</a:t>
             </a:r>
           </a:p>
         </p:txBody>
       </p:sp>
-      <p:sp>
-        <p:nvSpPr>
-          <p:cNvPr id="3" name="Content Placeholder 2">
-            <a:extLst>
-              <a:ext uri="{FF2B5EF4-FFF2-40B4-BE49-F238E27FC236}">
-                <a16:creationId xmlns:a16="http://schemas.microsoft.com/office/drawing/2014/main" id="{D4AE0ACD-9F75-495E-B098-74A2BD405186}"/>
-              </a:ext>
-            </a:extLst>
-          </p:cNvPr>
-          <p:cNvSpPr>
-            <a:spLocks noGrp="1"/>
-          </p:cNvSpPr>
+      <p:graphicFrame>
+        <p:nvGraphicFramePr>
+          <p:cNvPr id="4" name="Table 4">
+            <a:extLst>
+              <a:ext uri="{FF2B5EF4-FFF2-40B4-BE49-F238E27FC236}">
+                <a16:creationId xmlns:a16="http://schemas.microsoft.com/office/drawing/2014/main" id="{D7B3CBB2-2CAA-4F45-997A-8042D8791498}"/>
+              </a:ext>
+            </a:extLst>
+          </p:cNvPr>
+          <p:cNvGraphicFramePr>
+            <a:graphicFrameLocks noGrp="1"/>
+          </p:cNvGraphicFramePr>
           <p:nvPr>
-            <p:ph idx="1"/>
+            <p:extLst>
+              <p:ext uri="{D42A27DB-BD31-4B8C-83A1-F6EECF244321}">
+                <p14:modId xmlns:p14="http://schemas.microsoft.com/office/powerpoint/2010/main" val="3689789650"/>
+              </p:ext>
+            </p:extLst>
           </p:nvPr>
-        </p:nvSpPr>
-        <p:spPr/>
-        <p:txBody>
-          <a:bodyPr/>
-          <a:lstStyle/>
-          <a:p>
-            <a:r>
-              <a:rPr lang="en-US" dirty="0"/>
-              <a:t>A slice from a silicon ingot, that is no more then 0.1 inches in thickness.</a:t>
-            </a:r>
-          </a:p>
-          <a:p>
-            <a:r>
-              <a:rPr lang="en-US" dirty="0"/>
-              <a:t>Used to create chips via a series of processing steps (20-40 average steps) from </a:t>
-            </a:r>
-            <a:r>
-              <a:rPr lang="en-US" i="1" dirty="0"/>
-              <a:t>blank wafers </a:t>
-            </a:r>
-            <a:r>
-              <a:rPr lang="en-US" dirty="0"/>
-              <a:t>to </a:t>
-            </a:r>
-            <a:r>
-              <a:rPr lang="en-US" i="1" dirty="0"/>
-              <a:t>patterned wafers</a:t>
-            </a:r>
-            <a:r>
-              <a:rPr lang="en-US" dirty="0"/>
-              <a:t>.</a:t>
-            </a:r>
-          </a:p>
-        </p:txBody>
-      </p:sp>
-      <p:pic>
-        <p:nvPicPr>
-          <p:cNvPr id="5" name="Picture 4">
-            <a:extLst>
-              <a:ext uri="{FF2B5EF4-FFF2-40B4-BE49-F238E27FC236}">
-                <a16:creationId xmlns:a16="http://schemas.microsoft.com/office/drawing/2014/main" id="{46F64DD6-6E09-49A1-9A3A-19DB0A324A1C}"/>
-              </a:ext>
-            </a:extLst>
-          </p:cNvPr>
-          <p:cNvPicPr>
-            <a:picLocks noChangeAspect="1"/>
-          </p:cNvPicPr>
-          <p:nvPr/>
-        </p:nvPicPr>
-        <p:blipFill>
-          <a:blip r:embed="rId2">
-            <a:extLst>
-              <a:ext uri="{28A0092B-C50C-407E-A947-70E740481C1C}">
-                <a14:useLocalDpi xmlns:a14="http://schemas.microsoft.com/office/drawing/2010/main" val="0"/>
-              </a:ext>
-            </a:extLst>
-          </a:blip>
-          <a:stretch>
-            <a:fillRect/>
-          </a:stretch>
-        </p:blipFill>
-        <p:spPr>
-          <a:xfrm>
-            <a:off x="838200" y="3545305"/>
-            <a:ext cx="4620126" cy="2968431"/>
-          </a:xfrm>
-          <a:prstGeom prst="rect">
-            <a:avLst/>
-          </a:prstGeom>
-        </p:spPr>
-      </p:pic>
-      <p:pic>
-        <p:nvPicPr>
-          <p:cNvPr id="7" name="Picture 6">
-            <a:extLst>
-              <a:ext uri="{FF2B5EF4-FFF2-40B4-BE49-F238E27FC236}">
-                <a16:creationId xmlns:a16="http://schemas.microsoft.com/office/drawing/2014/main" id="{6C6C5136-DC11-49B6-9927-78558F9F9043}"/>
-              </a:ext>
-            </a:extLst>
-          </p:cNvPr>
-          <p:cNvPicPr>
-            <a:picLocks noChangeAspect="1"/>
-          </p:cNvPicPr>
-          <p:nvPr/>
-        </p:nvPicPr>
-        <p:blipFill>
-          <a:blip r:embed="rId3">
-            <a:extLst>
-              <a:ext uri="{28A0092B-C50C-407E-A947-70E740481C1C}">
-                <a14:useLocalDpi xmlns:a14="http://schemas.microsoft.com/office/drawing/2010/main" val="0"/>
-              </a:ext>
-            </a:extLst>
-          </a:blip>
-          <a:stretch>
-            <a:fillRect/>
-          </a:stretch>
-        </p:blipFill>
-        <p:spPr>
-          <a:xfrm>
-            <a:off x="5649327" y="3545305"/>
-            <a:ext cx="6372020" cy="2342148"/>
-          </a:xfrm>
-          <a:prstGeom prst="rect">
-            <a:avLst/>
-          </a:prstGeom>
-        </p:spPr>
-      </p:pic>
+        </p:nvGraphicFramePr>
+        <p:xfrm>
+          <a:off x="2032000" y="2316480"/>
+          <a:ext cx="8127999" cy="2225040"/>
+        </p:xfrm>
+        <a:graphic>
+          <a:graphicData uri="http://schemas.openxmlformats.org/drawingml/2006/table">
+            <a:tbl>
+              <a:tblPr firstRow="1" bandRow="1">
+                <a:tableStyleId>{5C22544A-7EE6-4342-B048-85BDC9FD1C3A}</a:tableStyleId>
+              </a:tblPr>
+              <a:tblGrid>
+                <a:gridCol w="2709333">
+                  <a:extLst>
+                    <a:ext uri="{9D8B030D-6E8A-4147-A177-3AD203B41FA5}">
+                      <a16:colId xmlns:a16="http://schemas.microsoft.com/office/drawing/2014/main" val="487511977"/>
+                    </a:ext>
+                  </a:extLst>
+                </a:gridCol>
+                <a:gridCol w="2709333">
+                  <a:extLst>
+                    <a:ext uri="{9D8B030D-6E8A-4147-A177-3AD203B41FA5}">
+                      <a16:colId xmlns:a16="http://schemas.microsoft.com/office/drawing/2014/main" val="724884083"/>
+                    </a:ext>
+                  </a:extLst>
+                </a:gridCol>
+                <a:gridCol w="2709333">
+                  <a:extLst>
+                    <a:ext uri="{9D8B030D-6E8A-4147-A177-3AD203B41FA5}">
+                      <a16:colId xmlns:a16="http://schemas.microsoft.com/office/drawing/2014/main" val="1467202984"/>
+                    </a:ext>
+                  </a:extLst>
+                </a:gridCol>
+              </a:tblGrid>
+              <a:tr h="370840">
+                <a:tc>
+                  <a:txBody>
+                    <a:bodyPr/>
+                    <a:lstStyle/>
+                    <a:p>
+                      <a:pPr algn="ctr"/>
+                      <a:r>
+                        <a:rPr lang="en-US" dirty="0"/>
+                        <a:t>Year</a:t>
+                      </a:r>
+                    </a:p>
+                  </a:txBody>
+                  <a:tcPr/>
+                </a:tc>
+                <a:tc>
+                  <a:txBody>
+                    <a:bodyPr/>
+                    <a:lstStyle/>
+                    <a:p>
+                      <a:pPr algn="ctr"/>
+                      <a:r>
+                        <a:rPr lang="en-US" dirty="0"/>
+                        <a:t>Technology</a:t>
+                      </a:r>
+                    </a:p>
+                  </a:txBody>
+                  <a:tcPr/>
+                </a:tc>
+                <a:tc>
+                  <a:txBody>
+                    <a:bodyPr/>
+                    <a:lstStyle/>
+                    <a:p>
+                      <a:pPr algn="ctr"/>
+                      <a:r>
+                        <a:rPr lang="en-US" dirty="0"/>
+                        <a:t>Performance / Unit Cost</a:t>
+                      </a:r>
+                    </a:p>
+                  </a:txBody>
+                  <a:tcPr/>
+                </a:tc>
+                <a:extLst>
+                  <a:ext uri="{0D108BD9-81ED-4DB2-BD59-A6C34878D82A}">
+                    <a16:rowId xmlns:a16="http://schemas.microsoft.com/office/drawing/2014/main" val="1553301030"/>
+                  </a:ext>
+                </a:extLst>
+              </a:tr>
+              <a:tr h="370840">
+                <a:tc>
+                  <a:txBody>
+                    <a:bodyPr/>
+                    <a:lstStyle/>
+                    <a:p>
+                      <a:pPr algn="ctr"/>
+                      <a:r>
+                        <a:rPr lang="en-US" dirty="0">
+                          <a:solidFill>
+                            <a:schemeClr val="bg2"/>
+                          </a:solidFill>
+                        </a:rPr>
+                        <a:t>1951</a:t>
+                      </a:r>
+                    </a:p>
+                  </a:txBody>
+                  <a:tcPr/>
+                </a:tc>
+                <a:tc>
+                  <a:txBody>
+                    <a:bodyPr/>
+                    <a:lstStyle/>
+                    <a:p>
+                      <a:pPr algn="ctr"/>
+                      <a:r>
+                        <a:rPr lang="en-US" dirty="0">
+                          <a:solidFill>
+                            <a:schemeClr val="bg2"/>
+                          </a:solidFill>
+                        </a:rPr>
+                        <a:t>Vacuum Tube</a:t>
+                      </a:r>
+                    </a:p>
+                  </a:txBody>
+                  <a:tcPr/>
+                </a:tc>
+                <a:tc>
+                  <a:txBody>
+                    <a:bodyPr/>
+                    <a:lstStyle/>
+                    <a:p>
+                      <a:pPr algn="ctr"/>
+                      <a:r>
+                        <a:rPr lang="en-US" dirty="0">
+                          <a:solidFill>
+                            <a:schemeClr val="bg2"/>
+                          </a:solidFill>
+                        </a:rPr>
+                        <a:t>1</a:t>
+                      </a:r>
+                    </a:p>
+                  </a:txBody>
+                  <a:tcPr/>
+                </a:tc>
+                <a:extLst>
+                  <a:ext uri="{0D108BD9-81ED-4DB2-BD59-A6C34878D82A}">
+                    <a16:rowId xmlns:a16="http://schemas.microsoft.com/office/drawing/2014/main" val="1270622738"/>
+                  </a:ext>
+                </a:extLst>
+              </a:tr>
+              <a:tr h="370840">
+                <a:tc>
+                  <a:txBody>
+                    <a:bodyPr/>
+                    <a:lstStyle/>
+                    <a:p>
+                      <a:pPr algn="ctr"/>
+                      <a:r>
+                        <a:rPr lang="en-US" dirty="0">
+                          <a:solidFill>
+                            <a:schemeClr val="bg2"/>
+                          </a:solidFill>
+                        </a:rPr>
+                        <a:t>1965</a:t>
+                      </a:r>
+                    </a:p>
+                  </a:txBody>
+                  <a:tcPr/>
+                </a:tc>
+                <a:tc>
+                  <a:txBody>
+                    <a:bodyPr/>
+                    <a:lstStyle/>
+                    <a:p>
+                      <a:pPr algn="ctr"/>
+                      <a:r>
+                        <a:rPr lang="en-US" dirty="0">
+                          <a:solidFill>
+                            <a:schemeClr val="bg2"/>
+                          </a:solidFill>
+                        </a:rPr>
+                        <a:t>Transistor</a:t>
+                      </a:r>
+                    </a:p>
+                  </a:txBody>
+                  <a:tcPr/>
+                </a:tc>
+                <a:tc>
+                  <a:txBody>
+                    <a:bodyPr/>
+                    <a:lstStyle/>
+                    <a:p>
+                      <a:pPr algn="ctr"/>
+                      <a:r>
+                        <a:rPr lang="en-US" dirty="0">
+                          <a:solidFill>
+                            <a:schemeClr val="bg2"/>
+                          </a:solidFill>
+                        </a:rPr>
+                        <a:t>35</a:t>
+                      </a:r>
+                    </a:p>
+                  </a:txBody>
+                  <a:tcPr/>
+                </a:tc>
+                <a:extLst>
+                  <a:ext uri="{0D108BD9-81ED-4DB2-BD59-A6C34878D82A}">
+                    <a16:rowId xmlns:a16="http://schemas.microsoft.com/office/drawing/2014/main" val="170763695"/>
+                  </a:ext>
+                </a:extLst>
+              </a:tr>
+              <a:tr h="370840">
+                <a:tc>
+                  <a:txBody>
+                    <a:bodyPr/>
+                    <a:lstStyle/>
+                    <a:p>
+                      <a:pPr algn="ctr"/>
+                      <a:r>
+                        <a:rPr lang="en-US" dirty="0">
+                          <a:solidFill>
+                            <a:schemeClr val="bg2"/>
+                          </a:solidFill>
+                        </a:rPr>
+                        <a:t>1975</a:t>
+                      </a:r>
+                    </a:p>
+                  </a:txBody>
+                  <a:tcPr/>
+                </a:tc>
+                <a:tc>
+                  <a:txBody>
+                    <a:bodyPr/>
+                    <a:lstStyle/>
+                    <a:p>
+                      <a:pPr algn="ctr"/>
+                      <a:r>
+                        <a:rPr lang="en-US" dirty="0">
+                          <a:solidFill>
+                            <a:schemeClr val="bg2"/>
+                          </a:solidFill>
+                        </a:rPr>
+                        <a:t>Integrated Circuit (IC)</a:t>
+                      </a:r>
+                    </a:p>
+                  </a:txBody>
+                  <a:tcPr/>
+                </a:tc>
+                <a:tc>
+                  <a:txBody>
+                    <a:bodyPr/>
+                    <a:lstStyle/>
+                    <a:p>
+                      <a:pPr algn="ctr"/>
+                      <a:r>
+                        <a:rPr lang="en-US" dirty="0">
+                          <a:solidFill>
+                            <a:schemeClr val="bg2"/>
+                          </a:solidFill>
+                        </a:rPr>
+                        <a:t>900</a:t>
+                      </a:r>
+                    </a:p>
+                  </a:txBody>
+                  <a:tcPr/>
+                </a:tc>
+                <a:extLst>
+                  <a:ext uri="{0D108BD9-81ED-4DB2-BD59-A6C34878D82A}">
+                    <a16:rowId xmlns:a16="http://schemas.microsoft.com/office/drawing/2014/main" val="3249501401"/>
+                  </a:ext>
+                </a:extLst>
+              </a:tr>
+              <a:tr h="370840">
+                <a:tc>
+                  <a:txBody>
+                    <a:bodyPr/>
+                    <a:lstStyle/>
+                    <a:p>
+                      <a:pPr algn="ctr"/>
+                      <a:r>
+                        <a:rPr lang="en-US" dirty="0">
+                          <a:solidFill>
+                            <a:schemeClr val="bg2"/>
+                          </a:solidFill>
+                        </a:rPr>
+                        <a:t>1995</a:t>
+                      </a:r>
+                    </a:p>
+                  </a:txBody>
+                  <a:tcPr/>
+                </a:tc>
+                <a:tc>
+                  <a:txBody>
+                    <a:bodyPr/>
+                    <a:lstStyle/>
+                    <a:p>
+                      <a:pPr algn="ctr"/>
+                      <a:r>
+                        <a:rPr lang="en-US" dirty="0">
+                          <a:solidFill>
+                            <a:schemeClr val="bg2"/>
+                          </a:solidFill>
+                        </a:rPr>
+                        <a:t>Very Large-Scale IC (VLSI)</a:t>
+                      </a:r>
+                    </a:p>
+                  </a:txBody>
+                  <a:tcPr/>
+                </a:tc>
+                <a:tc>
+                  <a:txBody>
+                    <a:bodyPr/>
+                    <a:lstStyle/>
+                    <a:p>
+                      <a:pPr algn="ctr"/>
+                      <a:r>
+                        <a:rPr lang="en-US" dirty="0">
+                          <a:solidFill>
+                            <a:schemeClr val="bg2"/>
+                          </a:solidFill>
+                        </a:rPr>
+                        <a:t>2,400,000</a:t>
+                      </a:r>
+                    </a:p>
+                  </a:txBody>
+                  <a:tcPr/>
+                </a:tc>
+                <a:extLst>
+                  <a:ext uri="{0D108BD9-81ED-4DB2-BD59-A6C34878D82A}">
+                    <a16:rowId xmlns:a16="http://schemas.microsoft.com/office/drawing/2014/main" val="2147322744"/>
+                  </a:ext>
+                </a:extLst>
+              </a:tr>
+              <a:tr h="370840">
+                <a:tc>
+                  <a:txBody>
+                    <a:bodyPr/>
+                    <a:lstStyle/>
+                    <a:p>
+                      <a:pPr algn="ctr"/>
+                      <a:r>
+                        <a:rPr lang="en-US" dirty="0">
+                          <a:solidFill>
+                            <a:schemeClr val="bg2"/>
+                          </a:solidFill>
+                        </a:rPr>
+                        <a:t>2013</a:t>
+                      </a:r>
+                    </a:p>
+                  </a:txBody>
+                  <a:tcPr/>
+                </a:tc>
+                <a:tc>
+                  <a:txBody>
+                    <a:bodyPr/>
+                    <a:lstStyle/>
+                    <a:p>
+                      <a:pPr algn="ctr"/>
+                      <a:r>
+                        <a:rPr lang="en-US" dirty="0">
+                          <a:solidFill>
+                            <a:schemeClr val="bg2"/>
+                          </a:solidFill>
+                        </a:rPr>
+                        <a:t>Ultra Large-Scale IC</a:t>
+                      </a:r>
+                    </a:p>
+                  </a:txBody>
+                  <a:tcPr/>
+                </a:tc>
+                <a:tc>
+                  <a:txBody>
+                    <a:bodyPr/>
+                    <a:lstStyle/>
+                    <a:p>
+                      <a:pPr algn="ctr"/>
+                      <a:r>
+                        <a:rPr lang="en-US" dirty="0">
+                          <a:solidFill>
+                            <a:schemeClr val="bg2"/>
+                          </a:solidFill>
+                        </a:rPr>
+                        <a:t>250,000,000,000</a:t>
+                      </a:r>
+                    </a:p>
+                  </a:txBody>
+                  <a:tcPr/>
+                </a:tc>
+                <a:extLst>
+                  <a:ext uri="{0D108BD9-81ED-4DB2-BD59-A6C34878D82A}">
+                    <a16:rowId xmlns:a16="http://schemas.microsoft.com/office/drawing/2014/main" val="2361732903"/>
+                  </a:ext>
+                </a:extLst>
+              </a:tr>
+            </a:tbl>
+          </a:graphicData>
+        </a:graphic>
+      </p:graphicFrame>
     </p:spTree>
     <p:extLst>
       <p:ext uri="{BB962C8B-B14F-4D97-AF65-F5344CB8AC3E}">
-        <p14:creationId xmlns:p14="http://schemas.microsoft.com/office/powerpoint/2010/main" val="839140339"/>
+        <p14:creationId xmlns:p14="http://schemas.microsoft.com/office/powerpoint/2010/main" val="3967968521"/>
       </p:ext>
     </p:extLst>
   </p:cSld>
@@ -9336,103 +10911,272 @@
           <a:p>
             <a:r>
               <a:rPr lang="en-US" dirty="0"/>
-              <a:t>Defect</a:t>
+              <a:t>Progress</a:t>
             </a:r>
           </a:p>
         </p:txBody>
       </p:sp>
-      <p:sp>
-        <p:nvSpPr>
-          <p:cNvPr id="3" name="Content Placeholder 2">
-            <a:extLst>
-              <a:ext uri="{FF2B5EF4-FFF2-40B4-BE49-F238E27FC236}">
-                <a16:creationId xmlns:a16="http://schemas.microsoft.com/office/drawing/2014/main" id="{D4AE0ACD-9F75-495E-B098-74A2BD405186}"/>
-              </a:ext>
-            </a:extLst>
-          </p:cNvPr>
-          <p:cNvSpPr>
-            <a:spLocks noGrp="1"/>
-          </p:cNvSpPr>
+      <p:graphicFrame>
+        <p:nvGraphicFramePr>
+          <p:cNvPr id="4" name="Table 4">
+            <a:extLst>
+              <a:ext uri="{FF2B5EF4-FFF2-40B4-BE49-F238E27FC236}">
+                <a16:creationId xmlns:a16="http://schemas.microsoft.com/office/drawing/2014/main" id="{D7B3CBB2-2CAA-4F45-997A-8042D8791498}"/>
+              </a:ext>
+            </a:extLst>
+          </p:cNvPr>
+          <p:cNvGraphicFramePr>
+            <a:graphicFrameLocks noGrp="1"/>
+          </p:cNvGraphicFramePr>
           <p:nvPr>
-            <p:ph idx="1"/>
+            <p:extLst>
+              <p:ext uri="{D42A27DB-BD31-4B8C-83A1-F6EECF244321}">
+                <p14:modId xmlns:p14="http://schemas.microsoft.com/office/powerpoint/2010/main" val="2371942369"/>
+              </p:ext>
+            </p:extLst>
           </p:nvPr>
-        </p:nvSpPr>
-        <p:spPr/>
-        <p:txBody>
-          <a:bodyPr/>
-          <a:lstStyle/>
-          <a:p>
-            <a:r>
-              <a:rPr lang="en-US" dirty="0"/>
-              <a:t>During the processing steps between </a:t>
-            </a:r>
-            <a:r>
-              <a:rPr lang="en-US" i="1" dirty="0"/>
-              <a:t>blank wafers</a:t>
-            </a:r>
-            <a:r>
-              <a:rPr lang="en-US" dirty="0"/>
-              <a:t> and </a:t>
-            </a:r>
-            <a:r>
-              <a:rPr lang="en-US" i="1" dirty="0"/>
-              <a:t>patterned wafers</a:t>
-            </a:r>
-            <a:r>
-              <a:rPr lang="en-US" dirty="0"/>
-              <a:t>, a microscopic flaw in the original wafer or the processing steps can cause the </a:t>
-            </a:r>
-            <a:r>
-              <a:rPr lang="en-US" i="1" dirty="0"/>
-              <a:t>die </a:t>
-            </a:r>
-            <a:r>
-              <a:rPr lang="en-US" dirty="0"/>
-              <a:t>to fail.</a:t>
-            </a:r>
-          </a:p>
-          <a:p>
-            <a:r>
-              <a:rPr lang="en-US" dirty="0"/>
-              <a:t>These types of flaws, called defects, make it </a:t>
-            </a:r>
-            <a:r>
-              <a:rPr lang="en-US" i="1" dirty="0"/>
-              <a:t>virtually impossible</a:t>
-            </a:r>
-            <a:r>
-              <a:rPr lang="en-US" dirty="0"/>
-              <a:t> to produce a perfect wafer.</a:t>
-            </a:r>
-          </a:p>
-          <a:p>
-            <a:r>
-              <a:rPr lang="en-US" dirty="0"/>
-              <a:t>One way to cope with possible imperfections can be to place many independent components on a single wafer (Prompting the </a:t>
-            </a:r>
-            <a:r>
-              <a:rPr lang="en-US" i="1" dirty="0"/>
-              <a:t>patterned wafer</a:t>
-            </a:r>
-            <a:r>
-              <a:rPr lang="en-US" dirty="0"/>
-              <a:t> to be chopped </a:t>
-            </a:r>
-            <a:r>
-              <a:rPr lang="en-US" i="1" dirty="0"/>
-              <a:t>into</a:t>
-            </a:r>
-            <a:r>
-              <a:rPr lang="en-US" dirty="0"/>
-              <a:t> these components.</a:t>
-            </a:r>
-          </a:p>
-        </p:txBody>
-      </p:sp>
+        </p:nvGraphicFramePr>
+        <p:xfrm>
+          <a:off x="3386667" y="2501900"/>
+          <a:ext cx="5418666" cy="1854200"/>
+        </p:xfrm>
+        <a:graphic>
+          <a:graphicData uri="http://schemas.openxmlformats.org/drawingml/2006/table">
+            <a:tbl>
+              <a:tblPr firstRow="1" bandRow="1">
+                <a:tableStyleId>{5C22544A-7EE6-4342-B048-85BDC9FD1C3A}</a:tableStyleId>
+              </a:tblPr>
+              <a:tblGrid>
+                <a:gridCol w="2709333">
+                  <a:extLst>
+                    <a:ext uri="{9D8B030D-6E8A-4147-A177-3AD203B41FA5}">
+                      <a16:colId xmlns:a16="http://schemas.microsoft.com/office/drawing/2014/main" val="487511977"/>
+                    </a:ext>
+                  </a:extLst>
+                </a:gridCol>
+                <a:gridCol w="2709333">
+                  <a:extLst>
+                    <a:ext uri="{9D8B030D-6E8A-4147-A177-3AD203B41FA5}">
+                      <a16:colId xmlns:a16="http://schemas.microsoft.com/office/drawing/2014/main" val="1467202984"/>
+                    </a:ext>
+                  </a:extLst>
+                </a:gridCol>
+              </a:tblGrid>
+              <a:tr h="370840">
+                <a:tc>
+                  <a:txBody>
+                    <a:bodyPr/>
+                    <a:lstStyle/>
+                    <a:p>
+                      <a:pPr algn="ctr"/>
+                      <a:r>
+                        <a:rPr lang="en-US" dirty="0"/>
+                        <a:t>Number of Years</a:t>
+                      </a:r>
+                    </a:p>
+                  </a:txBody>
+                  <a:tcPr/>
+                </a:tc>
+                <a:tc>
+                  <a:txBody>
+                    <a:bodyPr/>
+                    <a:lstStyle/>
+                    <a:p>
+                      <a:pPr algn="ctr"/>
+                      <a:r>
+                        <a:rPr lang="en-US" dirty="0"/>
+                        <a:t>Performance / Unit Cost</a:t>
+                      </a:r>
+                    </a:p>
+                  </a:txBody>
+                  <a:tcPr/>
+                </a:tc>
+                <a:extLst>
+                  <a:ext uri="{0D108BD9-81ED-4DB2-BD59-A6C34878D82A}">
+                    <a16:rowId xmlns:a16="http://schemas.microsoft.com/office/drawing/2014/main" val="1553301030"/>
+                  </a:ext>
+                </a:extLst>
+              </a:tr>
+              <a:tr h="370840">
+                <a:tc>
+                  <a:txBody>
+                    <a:bodyPr/>
+                    <a:lstStyle/>
+                    <a:p>
+                      <a:pPr algn="ctr"/>
+                      <a:r>
+                        <a:rPr lang="en-US" dirty="0">
+                          <a:solidFill>
+                            <a:schemeClr val="bg2"/>
+                          </a:solidFill>
+                        </a:rPr>
+                        <a:t>1951 – 1965 (14)</a:t>
+                      </a:r>
+                    </a:p>
+                  </a:txBody>
+                  <a:tcPr/>
+                </a:tc>
+                <a:tc>
+                  <a:txBody>
+                    <a:bodyPr/>
+                    <a:lstStyle/>
+                    <a:p>
+                      <a:pPr algn="ctr"/>
+                      <a:r>
+                        <a:rPr lang="en-US" dirty="0">
+                          <a:solidFill>
+                            <a:schemeClr val="bg2"/>
+                          </a:solidFill>
+                        </a:rPr>
+                        <a:t>35x</a:t>
+                      </a:r>
+                    </a:p>
+                  </a:txBody>
+                  <a:tcPr/>
+                </a:tc>
+                <a:extLst>
+                  <a:ext uri="{0D108BD9-81ED-4DB2-BD59-A6C34878D82A}">
+                    <a16:rowId xmlns:a16="http://schemas.microsoft.com/office/drawing/2014/main" val="1270622738"/>
+                  </a:ext>
+                </a:extLst>
+              </a:tr>
+              <a:tr h="370840">
+                <a:tc>
+                  <a:txBody>
+                    <a:bodyPr/>
+                    <a:lstStyle/>
+                    <a:p>
+                      <a:pPr algn="ctr"/>
+                      <a:r>
+                        <a:rPr lang="en-US" dirty="0">
+                          <a:solidFill>
+                            <a:schemeClr val="bg2"/>
+                          </a:solidFill>
+                        </a:rPr>
+                        <a:t>1965 – 1975 (10)</a:t>
+                      </a:r>
+                    </a:p>
+                  </a:txBody>
+                  <a:tcPr/>
+                </a:tc>
+                <a:tc>
+                  <a:txBody>
+                    <a:bodyPr/>
+                    <a:lstStyle/>
+                    <a:p>
+                      <a:pPr algn="ctr"/>
+                      <a:r>
+                        <a:rPr lang="en-US" dirty="0">
+                          <a:solidFill>
+                            <a:schemeClr val="bg2"/>
+                          </a:solidFill>
+                        </a:rPr>
+                        <a:t>~ 26x</a:t>
+                      </a:r>
+                    </a:p>
+                  </a:txBody>
+                  <a:tcPr/>
+                </a:tc>
+                <a:extLst>
+                  <a:ext uri="{0D108BD9-81ED-4DB2-BD59-A6C34878D82A}">
+                    <a16:rowId xmlns:a16="http://schemas.microsoft.com/office/drawing/2014/main" val="170763695"/>
+                  </a:ext>
+                </a:extLst>
+              </a:tr>
+              <a:tr h="370840">
+                <a:tc>
+                  <a:txBody>
+                    <a:bodyPr/>
+                    <a:lstStyle/>
+                    <a:p>
+                      <a:pPr algn="ctr"/>
+                      <a:r>
+                        <a:rPr lang="en-US" dirty="0">
+                          <a:solidFill>
+                            <a:schemeClr val="bg2"/>
+                          </a:solidFill>
+                        </a:rPr>
+                        <a:t>1975 – 1995 (20)</a:t>
+                      </a:r>
+                    </a:p>
+                  </a:txBody>
+                  <a:tcPr/>
+                </a:tc>
+                <a:tc>
+                  <a:txBody>
+                    <a:bodyPr/>
+                    <a:lstStyle/>
+                    <a:p>
+                      <a:pPr algn="ctr"/>
+                      <a:r>
+                        <a:rPr lang="en-US" dirty="0">
+                          <a:solidFill>
+                            <a:schemeClr val="bg2"/>
+                          </a:solidFill>
+                        </a:rPr>
+                        <a:t>~2667x</a:t>
+                      </a:r>
+                    </a:p>
+                  </a:txBody>
+                  <a:tcPr/>
+                </a:tc>
+                <a:extLst>
+                  <a:ext uri="{0D108BD9-81ED-4DB2-BD59-A6C34878D82A}">
+                    <a16:rowId xmlns:a16="http://schemas.microsoft.com/office/drawing/2014/main" val="3249501401"/>
+                  </a:ext>
+                </a:extLst>
+              </a:tr>
+              <a:tr h="370840">
+                <a:tc>
+                  <a:txBody>
+                    <a:bodyPr/>
+                    <a:lstStyle/>
+                    <a:p>
+                      <a:pPr algn="ctr"/>
+                      <a:r>
+                        <a:rPr lang="en-US" dirty="0">
+                          <a:solidFill>
+                            <a:schemeClr val="bg2"/>
+                          </a:solidFill>
+                        </a:rPr>
+                        <a:t>1995 – 2013 (18)</a:t>
+                      </a:r>
+                    </a:p>
+                  </a:txBody>
+                  <a:tcPr/>
+                </a:tc>
+                <a:tc>
+                  <a:txBody>
+                    <a:bodyPr/>
+                    <a:lstStyle/>
+                    <a:p>
+                      <a:pPr algn="ctr"/>
+                      <a:r>
+                        <a:rPr lang="en-US" dirty="0">
+                          <a:solidFill>
+                            <a:schemeClr val="bg2"/>
+                          </a:solidFill>
+                        </a:rPr>
+                        <a:t>~ 104167x</a:t>
+                      </a:r>
+                    </a:p>
+                  </a:txBody>
+                  <a:tcPr/>
+                </a:tc>
+                <a:extLst>
+                  <a:ext uri="{0D108BD9-81ED-4DB2-BD59-A6C34878D82A}">
+                    <a16:rowId xmlns:a16="http://schemas.microsoft.com/office/drawing/2014/main" val="2147322744"/>
+                  </a:ext>
+                </a:extLst>
+              </a:tr>
+            </a:tbl>
+          </a:graphicData>
+        </a:graphic>
+      </p:graphicFrame>
     </p:spTree>
     <p:extLst>
       <p:ext uri="{BB962C8B-B14F-4D97-AF65-F5344CB8AC3E}">
-        <p14:creationId xmlns:p14="http://schemas.microsoft.com/office/powerpoint/2010/main" val="4003186184"/>
+        <p14:creationId xmlns:p14="http://schemas.microsoft.com/office/powerpoint/2010/main" val="2304452387"/>
       </p:ext>
     </p:extLst>
   </p:cSld>
@@ -9464,7 +11208,7 @@
           <p:cNvPr id="2" name="Title 1">
             <a:extLst>
               <a:ext uri="{FF2B5EF4-FFF2-40B4-BE49-F238E27FC236}">
-                <a16:creationId xmlns:a16="http://schemas.microsoft.com/office/drawing/2014/main" id="{E4EDD309-5007-47B1-AB3C-D68CF0E2D53E}"/>
+                <a16:creationId xmlns:a16="http://schemas.microsoft.com/office/drawing/2014/main" id="{CD7A12AD-BD07-40F1-85A2-EE8EBF837A05}"/>
               </a:ext>
             </a:extLst>
           </p:cNvPr>
@@ -9482,26 +11226,70 @@
           <a:p>
             <a:r>
               <a:rPr lang="en-US" dirty="0"/>
-              <a:t>Representation -&gt; Wafer Defect</a:t>
+              <a:t>Vacuum Tubes</a:t>
+            </a:r>
+          </a:p>
+        </p:txBody>
+      </p:sp>
+      <p:sp>
+        <p:nvSpPr>
+          <p:cNvPr id="3" name="Content Placeholder 2">
+            <a:extLst>
+              <a:ext uri="{FF2B5EF4-FFF2-40B4-BE49-F238E27FC236}">
+                <a16:creationId xmlns:a16="http://schemas.microsoft.com/office/drawing/2014/main" id="{8B86F47D-6B84-40A9-B467-B69EB1A68AA4}"/>
+              </a:ext>
+            </a:extLst>
+          </p:cNvPr>
+          <p:cNvSpPr>
+            <a:spLocks noGrp="1"/>
+          </p:cNvSpPr>
+          <p:nvPr>
+            <p:ph idx="1"/>
+          </p:nvPr>
+        </p:nvSpPr>
+        <p:spPr/>
+        <p:txBody>
+          <a:bodyPr/>
+          <a:lstStyle/>
+          <a:p>
+            <a:r>
+              <a:rPr lang="en-US" dirty="0"/>
+              <a:t>Thermionic valves</a:t>
+            </a:r>
+          </a:p>
+          <a:p>
+            <a:endParaRPr lang="en-US" dirty="0"/>
+          </a:p>
+          <a:p>
+            <a:r>
+              <a:rPr lang="en-US" dirty="0"/>
+              <a:t>Vacuums are created within the tubes to allow electricity to flow</a:t>
+            </a:r>
+          </a:p>
+          <a:p>
+            <a:endParaRPr lang="en-US" dirty="0"/>
+          </a:p>
+          <a:p>
+            <a:r>
+              <a:rPr lang="en-US" dirty="0"/>
+              <a:t>Results in gargantuan machines</a:t>
             </a:r>
           </a:p>
         </p:txBody>
       </p:sp>
       <p:pic>
         <p:nvPicPr>
-          <p:cNvPr id="5" name="Content Placeholder 4">
-            <a:extLst>
-              <a:ext uri="{FF2B5EF4-FFF2-40B4-BE49-F238E27FC236}">
-                <a16:creationId xmlns:a16="http://schemas.microsoft.com/office/drawing/2014/main" id="{FC1A5CBB-C012-4934-8518-E0E1901A2FEE}"/>
+          <p:cNvPr id="2050" name="Picture 2">
+            <a:extLst>
+              <a:ext uri="{FF2B5EF4-FFF2-40B4-BE49-F238E27FC236}">
+                <a16:creationId xmlns:a16="http://schemas.microsoft.com/office/drawing/2014/main" id="{6E7982D7-2881-484B-A1A2-CA009C5448D7}"/>
               </a:ext>
             </a:extLst>
           </p:cNvPr>
           <p:cNvPicPr>
-            <a:picLocks noGrp="1" noChangeAspect="1"/>
+            <a:picLocks noChangeAspect="1" noChangeArrowheads="1"/>
           </p:cNvPicPr>
-          <p:nvPr>
-            <p:ph idx="1"/>
-          </p:nvPr>
+          <p:nvPr/>
         </p:nvPicPr>
         <p:blipFill>
           <a:blip r:embed="rId2">
@@ -9511,21 +11299,35 @@
               </a:ext>
             </a:extLst>
           </a:blip>
+          <a:srcRect/>
           <a:stretch>
             <a:fillRect/>
           </a:stretch>
         </p:blipFill>
-        <p:spPr>
+        <p:spPr bwMode="auto">
           <a:xfrm>
-            <a:off x="1693065" y="1825625"/>
-            <a:ext cx="8805869" cy="4351338"/>
+            <a:off x="7645797" y="4373174"/>
+            <a:ext cx="3708003" cy="1803789"/>
           </a:xfrm>
+          <a:prstGeom prst="rect">
+            <a:avLst/>
+          </a:prstGeom>
+          <a:noFill/>
+          <a:extLst>
+            <a:ext uri="{909E8E84-426E-40DD-AFC4-6F175D3DCCD1}">
+              <a14:hiddenFill xmlns:a14="http://schemas.microsoft.com/office/drawing/2010/main">
+                <a:solidFill>
+                  <a:srgbClr val="FFFFFF"/>
+                </a:solidFill>
+              </a14:hiddenFill>
+            </a:ext>
+          </a:extLst>
         </p:spPr>
       </p:pic>
     </p:spTree>
     <p:extLst>
       <p:ext uri="{BB962C8B-B14F-4D97-AF65-F5344CB8AC3E}">
-        <p14:creationId xmlns:p14="http://schemas.microsoft.com/office/powerpoint/2010/main" val="1105162607"/>
+        <p14:creationId xmlns:p14="http://schemas.microsoft.com/office/powerpoint/2010/main" val="153690943"/>
       </p:ext>
     </p:extLst>
   </p:cSld>
@@ -9557,7 +11359,7 @@
           <p:cNvPr id="2" name="Title 1">
             <a:extLst>
               <a:ext uri="{FF2B5EF4-FFF2-40B4-BE49-F238E27FC236}">
-                <a16:creationId xmlns:a16="http://schemas.microsoft.com/office/drawing/2014/main" id="{E4EDD309-5007-47B1-AB3C-D68CF0E2D53E}"/>
+                <a16:creationId xmlns:a16="http://schemas.microsoft.com/office/drawing/2014/main" id="{90EFF888-8EDF-4602-AE6A-16525CF197E6}"/>
               </a:ext>
             </a:extLst>
           </p:cNvPr>
@@ -9575,11 +11377,7 @@
           <a:p>
             <a:r>
               <a:rPr lang="en-US" dirty="0"/>
-              <a:t>Die </a:t>
-            </a:r>
-            <a:r>
-              <a:rPr lang="en-US" sz="2400" dirty="0"/>
-              <a:t>(Informally known as Chips)</a:t>
+              <a:t>Transistors</a:t>
             </a:r>
           </a:p>
         </p:txBody>
@@ -9589,7 +11387,7 @@
           <p:cNvPr id="3" name="Content Placeholder 2">
             <a:extLst>
               <a:ext uri="{FF2B5EF4-FFF2-40B4-BE49-F238E27FC236}">
-                <a16:creationId xmlns:a16="http://schemas.microsoft.com/office/drawing/2014/main" id="{D4AE0ACD-9F75-495E-B098-74A2BD405186}"/>
+                <a16:creationId xmlns:a16="http://schemas.microsoft.com/office/drawing/2014/main" id="{363C42CA-4871-4BD2-9557-8023F982BD92}"/>
               </a:ext>
             </a:extLst>
           </p:cNvPr>
@@ -9607,93 +11405,40 @@
           <a:p>
             <a:r>
               <a:rPr lang="en-US" dirty="0"/>
-              <a:t>When the </a:t>
-            </a:r>
-            <a:r>
-              <a:rPr lang="en-US" i="1" dirty="0"/>
-              <a:t>patterned wafer</a:t>
-            </a:r>
+              <a:t>“Brain cells” of modern computers</a:t>
+            </a:r>
+          </a:p>
+          <a:p>
+            <a:pPr lvl="1"/>
             <a:r>
               <a:rPr lang="en-US" dirty="0"/>
-              <a:t> is chopped, it can also be referred to as being </a:t>
-            </a:r>
-            <a:r>
-              <a:rPr lang="en-US" i="1" dirty="0"/>
-              <a:t>diced</a:t>
-            </a:r>
+              <a:t>Semiconductor device (Silicon)</a:t>
+            </a:r>
+          </a:p>
+          <a:p>
+            <a:endParaRPr lang="en-US" dirty="0"/>
+          </a:p>
+          <a:p>
             <a:r>
               <a:rPr lang="en-US" dirty="0"/>
-              <a:t>.</a:t>
-            </a:r>
+              <a:t>Apply current at or above a certain threshold to get current flowing</a:t>
+            </a:r>
+          </a:p>
+          <a:p>
+            <a:endParaRPr lang="en-US" dirty="0"/>
           </a:p>
           <a:p>
             <a:r>
               <a:rPr lang="en-US" dirty="0"/>
-              <a:t>The resulting rectangular sections that are cut from the </a:t>
-            </a:r>
-            <a:r>
-              <a:rPr lang="en-US" i="1" dirty="0"/>
-              <a:t>wafer</a:t>
-            </a:r>
-            <a:r>
-              <a:rPr lang="en-US" dirty="0"/>
-              <a:t> are known as </a:t>
-            </a:r>
-            <a:r>
-              <a:rPr lang="en-US" i="1" dirty="0"/>
-              <a:t>dies</a:t>
-            </a:r>
-            <a:r>
-              <a:rPr lang="en-US" dirty="0"/>
-              <a:t>, otherwise known as </a:t>
-            </a:r>
-            <a:r>
-              <a:rPr lang="en-US" i="1" dirty="0"/>
-              <a:t>chips.</a:t>
+              <a:t>Building blocks of integrated circuits</a:t>
             </a:r>
           </a:p>
         </p:txBody>
       </p:sp>
-      <p:pic>
-        <p:nvPicPr>
-          <p:cNvPr id="5" name="Picture 4">
-            <a:extLst>
-              <a:ext uri="{FF2B5EF4-FFF2-40B4-BE49-F238E27FC236}">
-                <a16:creationId xmlns:a16="http://schemas.microsoft.com/office/drawing/2014/main" id="{C0A853EF-E3EA-4CDC-94FB-42CB1528C23C}"/>
-              </a:ext>
-            </a:extLst>
-          </p:cNvPr>
-          <p:cNvPicPr>
-            <a:picLocks noChangeAspect="1"/>
-          </p:cNvPicPr>
-          <p:nvPr/>
-        </p:nvPicPr>
-        <p:blipFill>
-          <a:blip r:embed="rId2">
-            <a:extLst>
-              <a:ext uri="{28A0092B-C50C-407E-A947-70E740481C1C}">
-                <a14:useLocalDpi xmlns:a14="http://schemas.microsoft.com/office/drawing/2010/main" val="0"/>
-              </a:ext>
-            </a:extLst>
-          </a:blip>
-          <a:stretch>
-            <a:fillRect/>
-          </a:stretch>
-        </p:blipFill>
-        <p:spPr>
-          <a:xfrm>
-            <a:off x="8229600" y="4017378"/>
-            <a:ext cx="2475497" cy="2475497"/>
-          </a:xfrm>
-          <a:prstGeom prst="rect">
-            <a:avLst/>
-          </a:prstGeom>
-        </p:spPr>
-      </p:pic>
     </p:spTree>
     <p:extLst>
       <p:ext uri="{BB962C8B-B14F-4D97-AF65-F5344CB8AC3E}">
-        <p14:creationId xmlns:p14="http://schemas.microsoft.com/office/powerpoint/2010/main" val="2829591715"/>
+        <p14:creationId xmlns:p14="http://schemas.microsoft.com/office/powerpoint/2010/main" val="3511240321"/>
       </p:ext>
     </p:extLst>
   </p:cSld>
@@ -9725,7 +11470,7 @@
           <p:cNvPr id="2" name="Title 1">
             <a:extLst>
               <a:ext uri="{FF2B5EF4-FFF2-40B4-BE49-F238E27FC236}">
-                <a16:creationId xmlns:a16="http://schemas.microsoft.com/office/drawing/2014/main" id="{E4EDD309-5007-47B1-AB3C-D68CF0E2D53E}"/>
+                <a16:creationId xmlns:a16="http://schemas.microsoft.com/office/drawing/2014/main" id="{B127C629-4877-44D4-83C6-6CB3C71C2849}"/>
               </a:ext>
             </a:extLst>
           </p:cNvPr>
@@ -9743,7 +11488,7 @@
           <a:p>
             <a:r>
               <a:rPr lang="en-US" dirty="0"/>
-              <a:t>Yield</a:t>
+              <a:t>Integrated Circuits (ICs)</a:t>
             </a:r>
           </a:p>
         </p:txBody>
@@ -9753,7 +11498,7 @@
           <p:cNvPr id="3" name="Content Placeholder 2">
             <a:extLst>
               <a:ext uri="{FF2B5EF4-FFF2-40B4-BE49-F238E27FC236}">
-                <a16:creationId xmlns:a16="http://schemas.microsoft.com/office/drawing/2014/main" id="{D4AE0ACD-9F75-495E-B098-74A2BD405186}"/>
+                <a16:creationId xmlns:a16="http://schemas.microsoft.com/office/drawing/2014/main" id="{EAFD8A37-4D10-4D3D-B35B-3FF8BE941D21}"/>
               </a:ext>
             </a:extLst>
           </p:cNvPr>
@@ -9771,77 +11516,97 @@
           <a:p>
             <a:r>
               <a:rPr lang="en-US" dirty="0"/>
-              <a:t>From </a:t>
-            </a:r>
-            <a:r>
-              <a:rPr lang="en-US" i="1" dirty="0"/>
-              <a:t>dicing</a:t>
-            </a:r>
+              <a:t>Combination of transistors into a single chip</a:t>
+            </a:r>
+          </a:p>
+          <a:p>
+            <a:endParaRPr lang="en-US" dirty="0"/>
+          </a:p>
+          <a:p>
             <a:r>
               <a:rPr lang="en-US" dirty="0"/>
-              <a:t>, doing so enables you to discard the imperfect/flawed </a:t>
-            </a:r>
-            <a:r>
-              <a:rPr lang="en-US" i="1" dirty="0"/>
-              <a:t>dies</a:t>
-            </a:r>
+              <a:t>Moore’s Law (section 1.2)</a:t>
+            </a:r>
+          </a:p>
+          <a:p>
+            <a:pPr lvl="1"/>
             <a:r>
               <a:rPr lang="en-US" dirty="0"/>
-              <a:t> instead of the entire wafer.</a:t>
-            </a:r>
+              <a:t>Predict increase in number of transistors per chip</a:t>
+            </a:r>
+          </a:p>
+          <a:p>
+            <a:pPr lvl="1"/>
+            <a:endParaRPr lang="en-US" dirty="0"/>
           </a:p>
           <a:p>
             <a:r>
               <a:rPr lang="en-US" dirty="0"/>
-              <a:t>The comparison between the </a:t>
-            </a:r>
-            <a:r>
-              <a:rPr lang="en-US" i="1" dirty="0"/>
-              <a:t>dies</a:t>
-            </a:r>
-            <a:r>
-              <a:rPr lang="en-US" dirty="0"/>
-              <a:t> can also be referred to as the </a:t>
-            </a:r>
-            <a:r>
-              <a:rPr lang="en-US" i="1" dirty="0"/>
-              <a:t>yield</a:t>
-            </a:r>
-            <a:r>
-              <a:rPr lang="en-US" dirty="0"/>
-              <a:t> of a process, defined as the percentage/ratio between the good </a:t>
-            </a:r>
-            <a:r>
-              <a:rPr lang="en-US" i="1" dirty="0"/>
-              <a:t>dies</a:t>
-            </a:r>
-            <a:r>
-              <a:rPr lang="en-US" dirty="0"/>
-              <a:t> from the total </a:t>
-            </a:r>
-            <a:r>
-              <a:rPr lang="en-US" i="1" dirty="0"/>
-              <a:t>dies</a:t>
-            </a:r>
-            <a:r>
-              <a:rPr lang="en-US" dirty="0"/>
-              <a:t> on the </a:t>
-            </a:r>
-            <a:r>
-              <a:rPr lang="en-US" i="1" dirty="0"/>
-              <a:t>wafer</a:t>
-            </a:r>
-            <a:r>
-              <a:rPr lang="en-US" dirty="0"/>
-              <a:t> originally.</a:t>
-            </a:r>
+              <a:t>Silicon (semiconductor)</a:t>
+            </a:r>
+          </a:p>
+          <a:p>
+            <a:endParaRPr lang="en-US" dirty="0"/>
+          </a:p>
+          <a:p>
+            <a:endParaRPr lang="en-US" dirty="0"/>
+          </a:p>
+          <a:p>
+            <a:endParaRPr lang="en-US" dirty="0"/>
           </a:p>
         </p:txBody>
       </p:sp>
+      <p:pic>
+        <p:nvPicPr>
+          <p:cNvPr id="3074" name="Picture 2">
+            <a:extLst>
+              <a:ext uri="{FF2B5EF4-FFF2-40B4-BE49-F238E27FC236}">
+                <a16:creationId xmlns:a16="http://schemas.microsoft.com/office/drawing/2014/main" id="{930DE9D1-001F-4B52-B37C-3D5A35FD0BA7}"/>
+              </a:ext>
+            </a:extLst>
+          </p:cNvPr>
+          <p:cNvPicPr>
+            <a:picLocks noChangeAspect="1" noChangeArrowheads="1"/>
+          </p:cNvPicPr>
+          <p:nvPr/>
+        </p:nvPicPr>
+        <p:blipFill>
+          <a:blip r:embed="rId2">
+            <a:extLst>
+              <a:ext uri="{28A0092B-C50C-407E-A947-70E740481C1C}">
+                <a14:useLocalDpi xmlns:a14="http://schemas.microsoft.com/office/drawing/2010/main" val="0"/>
+              </a:ext>
+            </a:extLst>
+          </a:blip>
+          <a:srcRect/>
+          <a:stretch>
+            <a:fillRect/>
+          </a:stretch>
+        </p:blipFill>
+        <p:spPr bwMode="auto">
+          <a:xfrm>
+            <a:off x="7277878" y="3902029"/>
+            <a:ext cx="4075922" cy="2274933"/>
+          </a:xfrm>
+          <a:prstGeom prst="rect">
+            <a:avLst/>
+          </a:prstGeom>
+          <a:noFill/>
+          <a:extLst>
+            <a:ext uri="{909E8E84-426E-40DD-AFC4-6F175D3DCCD1}">
+              <a14:hiddenFill xmlns:a14="http://schemas.microsoft.com/office/drawing/2010/main">
+                <a:solidFill>
+                  <a:srgbClr val="FFFFFF"/>
+                </a:solidFill>
+              </a14:hiddenFill>
+            </a:ext>
+          </a:extLst>
+        </p:spPr>
+      </p:pic>
     </p:spTree>
     <p:extLst>
       <p:ext uri="{BB962C8B-B14F-4D97-AF65-F5344CB8AC3E}">
-        <p14:creationId xmlns:p14="http://schemas.microsoft.com/office/powerpoint/2010/main" val="3732068591"/>
+        <p14:creationId xmlns:p14="http://schemas.microsoft.com/office/powerpoint/2010/main" val="315744846"/>
       </p:ext>
     </p:extLst>
   </p:cSld>

</xml_diff>

<commit_message>
Conclusion/Concluding Food for Thought
</commit_message>
<xml_diff>
--- a/csci370_ch1_presentation.pptx
+++ b/csci370_ch1_presentation.pptx
@@ -9879,7 +9879,7 @@
           <a:p>
             <a:r>
               <a:rPr lang="en-US" dirty="0"/>
-              <a:t>Conclusion</a:t>
+              <a:t>Food for Thought: Costs</a:t>
             </a:r>
           </a:p>
         </p:txBody>
@@ -9906,13 +9906,111 @@
           <a:lstStyle/>
           <a:p>
             <a:r>
-              <a:rPr lang="en-US"/>
-              <a:t>&lt;…&gt;</a:t>
-            </a:r>
+              <a:rPr lang="en-US" dirty="0"/>
+              <a:t>Fluctuating Costs of an Integrated Circuit</a:t>
+            </a:r>
+          </a:p>
+          <a:p>
+            <a:pPr lvl="1"/>
+            <a:r>
+              <a:rPr lang="en-US" dirty="0"/>
+              <a:t>Yield</a:t>
+            </a:r>
+          </a:p>
+          <a:p>
+            <a:pPr lvl="1"/>
+            <a:r>
+              <a:rPr lang="en-US" dirty="0"/>
+              <a:t>Dies per wafer</a:t>
+            </a:r>
+          </a:p>
+          <a:p>
+            <a:pPr lvl="1"/>
+            <a:endParaRPr lang="en-US" dirty="0"/>
+          </a:p>
+          <a:p>
+            <a:pPr lvl="1"/>
+            <a:r>
+              <a:rPr lang="en-US" dirty="0"/>
+              <a:t>Cost Reduction</a:t>
+            </a:r>
+          </a:p>
+          <a:p>
+            <a:pPr lvl="2"/>
+            <a:r>
+              <a:rPr lang="en-US" dirty="0"/>
+              <a:t>The cost can be determined from three different equations</a:t>
+            </a:r>
+          </a:p>
+          <a:p>
+            <a:pPr lvl="2"/>
+            <a:r>
+              <a:rPr lang="en-US" dirty="0"/>
+              <a:t>First: Derive</a:t>
+            </a:r>
+          </a:p>
+          <a:p>
+            <a:pPr lvl="2"/>
+            <a:r>
+              <a:rPr lang="en-US" dirty="0"/>
+              <a:t>Second: Approximation</a:t>
+            </a:r>
+          </a:p>
+          <a:p>
+            <a:pPr lvl="2"/>
+            <a:r>
+              <a:rPr lang="en-US" dirty="0"/>
+              <a:t>Third: Empirical observations of yields</a:t>
+            </a:r>
+          </a:p>
+          <a:p>
+            <a:pPr lvl="2"/>
+            <a:r>
+              <a:rPr lang="en-US" dirty="0"/>
+              <a:t>Generally NOT linear</a:t>
+            </a:r>
+          </a:p>
+          <a:p>
             <a:endParaRPr lang="en-US" dirty="0"/>
           </a:p>
         </p:txBody>
       </p:sp>
+      <p:pic>
+        <p:nvPicPr>
+          <p:cNvPr id="5" name="Picture 4">
+            <a:extLst>
+              <a:ext uri="{FF2B5EF4-FFF2-40B4-BE49-F238E27FC236}">
+                <a16:creationId xmlns:a16="http://schemas.microsoft.com/office/drawing/2014/main" id="{39417DBD-CD8C-4FFA-8804-A766EF8825ED}"/>
+              </a:ext>
+            </a:extLst>
+          </p:cNvPr>
+          <p:cNvPicPr>
+            <a:picLocks noChangeAspect="1"/>
+          </p:cNvPicPr>
+          <p:nvPr/>
+        </p:nvPicPr>
+        <p:blipFill>
+          <a:blip r:embed="rId2">
+            <a:extLst>
+              <a:ext uri="{28A0092B-C50C-407E-A947-70E740481C1C}">
+                <a14:useLocalDpi xmlns:a14="http://schemas.microsoft.com/office/drawing/2010/main" val="0"/>
+              </a:ext>
+            </a:extLst>
+          </a:blip>
+          <a:stretch>
+            <a:fillRect/>
+          </a:stretch>
+        </p:blipFill>
+        <p:spPr>
+          <a:xfrm>
+            <a:off x="6316793" y="4283243"/>
+            <a:ext cx="4457496" cy="1604210"/>
+          </a:xfrm>
+          <a:prstGeom prst="rect">
+            <a:avLst/>
+          </a:prstGeom>
+        </p:spPr>
+      </p:pic>
     </p:spTree>
     <p:extLst>
       <p:ext uri="{BB962C8B-B14F-4D97-AF65-F5344CB8AC3E}">

</xml_diff>